<commit_message>
Adding placards, but information is still missing
</commit_message>
<xml_diff>
--- a/resources/Culturgest-espacos/culturgest-maps.sponsors-and-posters.pptx
+++ b/resources/Culturgest-espacos/culturgest-maps.sponsors-and-posters.pptx
@@ -289,7 +289,7 @@
           <a:p>
             <a:fld id="{3BFD2B54-DB31-CC4F-AB57-0FBF0E49E955}" type="datetimeFigureOut">
               <a:rPr lang="en-US" smtClean="0"/>
-              <a:t>08/09/15</a:t>
+              <a:t>14/09/15</a:t>
             </a:fld>
             <a:endParaRPr lang="en-US"/>
           </a:p>
@@ -459,7 +459,7 @@
           <a:p>
             <a:fld id="{3BFD2B54-DB31-CC4F-AB57-0FBF0E49E955}" type="datetimeFigureOut">
               <a:rPr lang="en-US" smtClean="0"/>
-              <a:t>08/09/15</a:t>
+              <a:t>14/09/15</a:t>
             </a:fld>
             <a:endParaRPr lang="en-US"/>
           </a:p>
@@ -639,7 +639,7 @@
           <a:p>
             <a:fld id="{3BFD2B54-DB31-CC4F-AB57-0FBF0E49E955}" type="datetimeFigureOut">
               <a:rPr lang="en-US" smtClean="0"/>
-              <a:t>08/09/15</a:t>
+              <a:t>14/09/15</a:t>
             </a:fld>
             <a:endParaRPr lang="en-US"/>
           </a:p>
@@ -809,7 +809,7 @@
           <a:p>
             <a:fld id="{3BFD2B54-DB31-CC4F-AB57-0FBF0E49E955}" type="datetimeFigureOut">
               <a:rPr lang="en-US" smtClean="0"/>
-              <a:t>08/09/15</a:t>
+              <a:t>14/09/15</a:t>
             </a:fld>
             <a:endParaRPr lang="en-US"/>
           </a:p>
@@ -1055,7 +1055,7 @@
           <a:p>
             <a:fld id="{3BFD2B54-DB31-CC4F-AB57-0FBF0E49E955}" type="datetimeFigureOut">
               <a:rPr lang="en-US" smtClean="0"/>
-              <a:t>08/09/15</a:t>
+              <a:t>14/09/15</a:t>
             </a:fld>
             <a:endParaRPr lang="en-US"/>
           </a:p>
@@ -1343,7 +1343,7 @@
           <a:p>
             <a:fld id="{3BFD2B54-DB31-CC4F-AB57-0FBF0E49E955}" type="datetimeFigureOut">
               <a:rPr lang="en-US" smtClean="0"/>
-              <a:t>08/09/15</a:t>
+              <a:t>14/09/15</a:t>
             </a:fld>
             <a:endParaRPr lang="en-US"/>
           </a:p>
@@ -1765,7 +1765,7 @@
           <a:p>
             <a:fld id="{3BFD2B54-DB31-CC4F-AB57-0FBF0E49E955}" type="datetimeFigureOut">
               <a:rPr lang="en-US" smtClean="0"/>
-              <a:t>08/09/15</a:t>
+              <a:t>14/09/15</a:t>
             </a:fld>
             <a:endParaRPr lang="en-US"/>
           </a:p>
@@ -1883,7 +1883,7 @@
           <a:p>
             <a:fld id="{3BFD2B54-DB31-CC4F-AB57-0FBF0E49E955}" type="datetimeFigureOut">
               <a:rPr lang="en-US" smtClean="0"/>
-              <a:t>08/09/15</a:t>
+              <a:t>14/09/15</a:t>
             </a:fld>
             <a:endParaRPr lang="en-US"/>
           </a:p>
@@ -1978,7 +1978,7 @@
           <a:p>
             <a:fld id="{3BFD2B54-DB31-CC4F-AB57-0FBF0E49E955}" type="datetimeFigureOut">
               <a:rPr lang="en-US" smtClean="0"/>
-              <a:t>08/09/15</a:t>
+              <a:t>14/09/15</a:t>
             </a:fld>
             <a:endParaRPr lang="en-US"/>
           </a:p>
@@ -2255,7 +2255,7 @@
           <a:p>
             <a:fld id="{3BFD2B54-DB31-CC4F-AB57-0FBF0E49E955}" type="datetimeFigureOut">
               <a:rPr lang="en-US" smtClean="0"/>
-              <a:t>08/09/15</a:t>
+              <a:t>14/09/15</a:t>
             </a:fld>
             <a:endParaRPr lang="en-US"/>
           </a:p>
@@ -2508,7 +2508,7 @@
           <a:p>
             <a:fld id="{3BFD2B54-DB31-CC4F-AB57-0FBF0E49E955}" type="datetimeFigureOut">
               <a:rPr lang="en-US" smtClean="0"/>
-              <a:t>08/09/15</a:t>
+              <a:t>14/09/15</a:t>
             </a:fld>
             <a:endParaRPr lang="en-US"/>
           </a:p>
@@ -2721,7 +2721,7 @@
           <a:p>
             <a:fld id="{3BFD2B54-DB31-CC4F-AB57-0FBF0E49E955}" type="datetimeFigureOut">
               <a:rPr lang="en-US" smtClean="0"/>
-              <a:t>08/09/15</a:t>
+              <a:t>14/09/15</a:t>
             </a:fld>
             <a:endParaRPr lang="en-US"/>
           </a:p>
@@ -3098,7 +3098,7 @@
       </p:grpSpPr>
       <p:grpSp>
         <p:nvGrpSpPr>
-          <p:cNvPr id="36" name="Group 35"/>
+          <p:cNvPr id="30" name="Group 29"/>
           <p:cNvGrpSpPr/>
           <p:nvPr/>
         </p:nvGrpSpPr>
@@ -3110,441 +3110,426 @@
             <a:chExt cx="3944124" cy="5101590"/>
           </a:xfrm>
         </p:grpSpPr>
-        <p:grpSp>
-          <p:nvGrpSpPr>
-            <p:cNvPr id="30" name="Group 29"/>
-            <p:cNvGrpSpPr/>
+        <p:pic>
+          <p:nvPicPr>
+            <p:cNvPr id="4" name="Picture 3"/>
+            <p:cNvPicPr>
+              <a:picLocks noChangeAspect="1"/>
+            </p:cNvPicPr>
             <p:nvPr/>
-          </p:nvGrpSpPr>
-          <p:grpSpPr>
+          </p:nvPicPr>
+          <p:blipFill>
+            <a:blip r:embed="rId2"/>
+            <a:stretch>
+              <a:fillRect/>
+            </a:stretch>
+          </p:blipFill>
+          <p:spPr>
             <a:xfrm>
               <a:off x="4931633" y="927100"/>
-              <a:ext cx="3944124" cy="5101590"/>
-              <a:chOff x="4931633" y="927100"/>
-              <a:chExt cx="3944124" cy="5101590"/>
+              <a:ext cx="3822700" cy="5003800"/>
             </a:xfrm>
-          </p:grpSpPr>
-          <p:pic>
-            <p:nvPicPr>
-              <p:cNvPr id="4" name="Picture 3"/>
-              <p:cNvPicPr>
-                <a:picLocks noChangeAspect="1"/>
-              </p:cNvPicPr>
-              <p:nvPr/>
-            </p:nvPicPr>
-            <p:blipFill>
-              <a:blip r:embed="rId2"/>
-              <a:stretch>
-                <a:fillRect/>
-              </a:stretch>
-            </p:blipFill>
-            <p:spPr>
-              <a:xfrm>
-                <a:off x="4931633" y="927100"/>
-                <a:ext cx="3822700" cy="5003800"/>
-              </a:xfrm>
-              <a:prstGeom prst="rect">
-                <a:avLst/>
-              </a:prstGeom>
-            </p:spPr>
-          </p:pic>
-          <p:sp>
-            <p:nvSpPr>
-              <p:cNvPr id="28" name="Rectangle 27"/>
-              <p:cNvSpPr/>
-              <p:nvPr/>
-            </p:nvSpPr>
-            <p:spPr>
-              <a:xfrm>
-                <a:off x="5276512" y="3563180"/>
-                <a:ext cx="394154" cy="255453"/>
-              </a:xfrm>
-              <a:prstGeom prst="rect">
-                <a:avLst/>
-              </a:prstGeom>
-              <a:ln>
-                <a:noFill/>
-              </a:ln>
-            </p:spPr>
-            <p:style>
-              <a:lnRef idx="2">
-                <a:schemeClr val="accent1"/>
-              </a:lnRef>
-              <a:fillRef idx="1">
-                <a:schemeClr val="lt1"/>
-              </a:fillRef>
-              <a:effectRef idx="0">
-                <a:schemeClr val="accent1"/>
-              </a:effectRef>
-              <a:fontRef idx="minor">
-                <a:schemeClr val="dk1"/>
-              </a:fontRef>
-            </p:style>
-            <p:txBody>
-              <a:bodyPr rtlCol="0" anchor="ctr"/>
-              <a:lstStyle/>
-              <a:p>
-                <a:pPr algn="ctr"/>
-                <a:endParaRPr lang="en-US"/>
-              </a:p>
-            </p:txBody>
-          </p:sp>
-          <p:sp>
-            <p:nvSpPr>
-              <p:cNvPr id="27" name="Rectangle 26"/>
-              <p:cNvSpPr/>
-              <p:nvPr/>
-            </p:nvSpPr>
-            <p:spPr>
-              <a:xfrm>
-                <a:off x="8481603" y="5773237"/>
-                <a:ext cx="394154" cy="255453"/>
-              </a:xfrm>
-              <a:prstGeom prst="rect">
-                <a:avLst/>
-              </a:prstGeom>
-              <a:ln>
-                <a:noFill/>
-              </a:ln>
-            </p:spPr>
-            <p:style>
-              <a:lnRef idx="2">
-                <a:schemeClr val="accent1"/>
-              </a:lnRef>
-              <a:fillRef idx="1">
-                <a:schemeClr val="lt1"/>
-              </a:fillRef>
-              <a:effectRef idx="0">
-                <a:schemeClr val="accent1"/>
-              </a:effectRef>
-              <a:fontRef idx="minor">
-                <a:schemeClr val="dk1"/>
-              </a:fontRef>
-            </p:style>
-            <p:txBody>
-              <a:bodyPr rtlCol="0" anchor="ctr"/>
-              <a:lstStyle/>
-              <a:p>
-                <a:pPr algn="ctr"/>
-                <a:endParaRPr lang="en-US"/>
-              </a:p>
-            </p:txBody>
-          </p:sp>
-        </p:grpSp>
+            <a:prstGeom prst="rect">
+              <a:avLst/>
+            </a:prstGeom>
+          </p:spPr>
+        </p:pic>
         <p:sp>
           <p:nvSpPr>
-            <p:cNvPr id="31" name="Oval 30"/>
-            <p:cNvSpPr>
-              <a:spLocks noChangeAspect="1"/>
-            </p:cNvSpPr>
+            <p:cNvPr id="28" name="Rectangle 27"/>
+            <p:cNvSpPr/>
             <p:nvPr/>
           </p:nvSpPr>
           <p:spPr>
             <a:xfrm>
-              <a:off x="5186512" y="3524795"/>
-              <a:ext cx="216000" cy="216000"/>
+              <a:off x="5276512" y="3563180"/>
+              <a:ext cx="394154" cy="255453"/>
             </a:xfrm>
-            <a:prstGeom prst="ellipse">
+            <a:prstGeom prst="rect">
               <a:avLst/>
             </a:prstGeom>
-            <a:solidFill>
-              <a:srgbClr val="FF0000"/>
-            </a:solidFill>
             <a:ln>
-              <a:solidFill>
-                <a:srgbClr val="FF0000"/>
-              </a:solidFill>
+              <a:noFill/>
             </a:ln>
           </p:spPr>
           <p:style>
             <a:lnRef idx="2">
-              <a:schemeClr val="accent2"/>
+              <a:schemeClr val="accent1"/>
             </a:lnRef>
             <a:fillRef idx="1">
               <a:schemeClr val="lt1"/>
             </a:fillRef>
             <a:effectRef idx="0">
-              <a:schemeClr val="accent2"/>
+              <a:schemeClr val="accent1"/>
             </a:effectRef>
             <a:fontRef idx="minor">
               <a:schemeClr val="dk1"/>
             </a:fontRef>
           </p:style>
           <p:txBody>
-            <a:bodyPr wrap="none" lIns="0" tIns="0" rIns="0" bIns="18000" rtlCol="0" anchor="ctr"/>
+            <a:bodyPr rtlCol="0" anchor="ctr"/>
             <a:lstStyle/>
             <a:p>
               <a:pPr algn="ctr"/>
-              <a:r>
-                <a:rPr lang="en-US" sz="1400" dirty="0" smtClean="0">
-                  <a:solidFill>
-                    <a:schemeClr val="bg1"/>
-                  </a:solidFill>
-                  <a:latin typeface="Arial"/>
-                  <a:cs typeface="Arial"/>
-                </a:rPr>
-                <a:t>1</a:t>
-              </a:r>
-              <a:endParaRPr lang="en-US" sz="1400" dirty="0">
-                <a:solidFill>
-                  <a:schemeClr val="bg1"/>
-                </a:solidFill>
-                <a:latin typeface="Arial"/>
-                <a:cs typeface="Arial"/>
-              </a:endParaRPr>
+              <a:endParaRPr lang="en-US"/>
             </a:p>
           </p:txBody>
         </p:sp>
         <p:sp>
           <p:nvSpPr>
-            <p:cNvPr id="32" name="Oval 31"/>
-            <p:cNvSpPr>
-              <a:spLocks noChangeAspect="1"/>
-            </p:cNvSpPr>
+            <p:cNvPr id="27" name="Rectangle 26"/>
+            <p:cNvSpPr/>
             <p:nvPr/>
           </p:nvSpPr>
           <p:spPr>
             <a:xfrm>
-              <a:off x="5149249" y="2606332"/>
-              <a:ext cx="216000" cy="216000"/>
+              <a:off x="8481603" y="5773237"/>
+              <a:ext cx="394154" cy="255453"/>
             </a:xfrm>
-            <a:prstGeom prst="ellipse">
+            <a:prstGeom prst="rect">
               <a:avLst/>
             </a:prstGeom>
-            <a:solidFill>
-              <a:srgbClr val="FF0000"/>
-            </a:solidFill>
             <a:ln>
-              <a:solidFill>
-                <a:srgbClr val="FF0000"/>
-              </a:solidFill>
+              <a:noFill/>
             </a:ln>
           </p:spPr>
           <p:style>
             <a:lnRef idx="2">
-              <a:schemeClr val="accent2"/>
+              <a:schemeClr val="accent1"/>
             </a:lnRef>
             <a:fillRef idx="1">
               <a:schemeClr val="lt1"/>
             </a:fillRef>
             <a:effectRef idx="0">
-              <a:schemeClr val="accent2"/>
+              <a:schemeClr val="accent1"/>
             </a:effectRef>
             <a:fontRef idx="minor">
               <a:schemeClr val="dk1"/>
             </a:fontRef>
           </p:style>
           <p:txBody>
-            <a:bodyPr wrap="none" lIns="0" tIns="0" rIns="0" bIns="18000" rtlCol="0" anchor="ctr"/>
+            <a:bodyPr rtlCol="0" anchor="ctr"/>
             <a:lstStyle/>
             <a:p>
               <a:pPr algn="ctr"/>
-              <a:r>
-                <a:rPr lang="en-US" sz="1400" dirty="0">
-                  <a:solidFill>
-                    <a:schemeClr val="bg1"/>
-                  </a:solidFill>
-                  <a:latin typeface="Arial"/>
-                  <a:cs typeface="Arial"/>
-                </a:rPr>
-                <a:t>5</a:t>
-              </a:r>
+              <a:endParaRPr lang="en-US"/>
             </a:p>
           </p:txBody>
         </p:sp>
-        <p:sp>
-          <p:nvSpPr>
-            <p:cNvPr id="33" name="Oval 32"/>
-            <p:cNvSpPr>
-              <a:spLocks noChangeAspect="1"/>
-            </p:cNvSpPr>
-            <p:nvPr/>
-          </p:nvSpPr>
-          <p:spPr>
-            <a:xfrm>
-              <a:off x="6001729" y="2582696"/>
-              <a:ext cx="216000" cy="216000"/>
-            </a:xfrm>
-            <a:prstGeom prst="ellipse">
-              <a:avLst/>
-            </a:prstGeom>
+      </p:grpSp>
+      <p:sp>
+        <p:nvSpPr>
+          <p:cNvPr id="31" name="Oval 30"/>
+          <p:cNvSpPr>
+            <a:spLocks noChangeAspect="1"/>
+          </p:cNvSpPr>
+          <p:nvPr/>
+        </p:nvSpPr>
+        <p:spPr>
+          <a:xfrm>
+            <a:off x="5186512" y="3524795"/>
+            <a:ext cx="216000" cy="216000"/>
+          </a:xfrm>
+          <a:prstGeom prst="ellipse">
+            <a:avLst/>
+          </a:prstGeom>
+          <a:solidFill>
+            <a:srgbClr val="FF0000"/>
+          </a:solidFill>
+          <a:ln>
             <a:solidFill>
               <a:srgbClr val="FF0000"/>
             </a:solidFill>
-            <a:ln>
-              <a:solidFill>
-                <a:srgbClr val="FF0000"/>
-              </a:solidFill>
-            </a:ln>
-          </p:spPr>
-          <p:style>
-            <a:lnRef idx="2">
-              <a:schemeClr val="accent2"/>
-            </a:lnRef>
-            <a:fillRef idx="1">
-              <a:schemeClr val="lt1"/>
-            </a:fillRef>
-            <a:effectRef idx="0">
-              <a:schemeClr val="accent2"/>
-            </a:effectRef>
-            <a:fontRef idx="minor">
-              <a:schemeClr val="dk1"/>
-            </a:fontRef>
-          </p:style>
-          <p:txBody>
-            <a:bodyPr wrap="none" lIns="0" tIns="0" rIns="0" bIns="18000" rtlCol="0" anchor="ctr"/>
-            <a:lstStyle/>
-            <a:p>
-              <a:pPr algn="ctr"/>
-              <a:r>
-                <a:rPr lang="en-US" sz="1400" dirty="0" smtClean="0">
-                  <a:solidFill>
-                    <a:schemeClr val="bg1"/>
-                  </a:solidFill>
-                  <a:latin typeface="Arial"/>
-                  <a:cs typeface="Arial"/>
-                </a:rPr>
-                <a:t>3</a:t>
-              </a:r>
-              <a:endParaRPr lang="en-US" sz="1400" dirty="0">
+          </a:ln>
+        </p:spPr>
+        <p:style>
+          <a:lnRef idx="2">
+            <a:schemeClr val="accent2"/>
+          </a:lnRef>
+          <a:fillRef idx="1">
+            <a:schemeClr val="lt1"/>
+          </a:fillRef>
+          <a:effectRef idx="0">
+            <a:schemeClr val="accent2"/>
+          </a:effectRef>
+          <a:fontRef idx="minor">
+            <a:schemeClr val="dk1"/>
+          </a:fontRef>
+        </p:style>
+        <p:txBody>
+          <a:bodyPr wrap="none" lIns="0" tIns="0" rIns="0" bIns="18000" rtlCol="0" anchor="ctr"/>
+          <a:lstStyle/>
+          <a:p>
+            <a:pPr algn="ctr"/>
+            <a:r>
+              <a:rPr lang="en-US" sz="1400" dirty="0" smtClean="0">
                 <a:solidFill>
                   <a:schemeClr val="bg1"/>
                 </a:solidFill>
                 <a:latin typeface="Arial"/>
                 <a:cs typeface="Arial"/>
-              </a:endParaRPr>
-            </a:p>
-          </p:txBody>
-        </p:sp>
-        <p:sp>
-          <p:nvSpPr>
-            <p:cNvPr id="34" name="Oval 33"/>
-            <p:cNvSpPr>
-              <a:spLocks noChangeAspect="1"/>
-            </p:cNvSpPr>
-            <p:nvPr/>
-          </p:nvSpPr>
-          <p:spPr>
-            <a:xfrm>
-              <a:off x="5293589" y="1511534"/>
-              <a:ext cx="216000" cy="216000"/>
-            </a:xfrm>
-            <a:prstGeom prst="ellipse">
-              <a:avLst/>
-            </a:prstGeom>
+              </a:rPr>
+              <a:t>1</a:t>
+            </a:r>
+            <a:endParaRPr lang="en-US" sz="1400" dirty="0">
+              <a:solidFill>
+                <a:schemeClr val="bg1"/>
+              </a:solidFill>
+              <a:latin typeface="Arial"/>
+              <a:cs typeface="Arial"/>
+            </a:endParaRPr>
+          </a:p>
+        </p:txBody>
+      </p:sp>
+      <p:sp>
+        <p:nvSpPr>
+          <p:cNvPr id="32" name="Oval 31"/>
+          <p:cNvSpPr>
+            <a:spLocks noChangeAspect="1"/>
+          </p:cNvSpPr>
+          <p:nvPr/>
+        </p:nvSpPr>
+        <p:spPr>
+          <a:xfrm>
+            <a:off x="5149249" y="2606332"/>
+            <a:ext cx="216000" cy="216000"/>
+          </a:xfrm>
+          <a:prstGeom prst="ellipse">
+            <a:avLst/>
+          </a:prstGeom>
+          <a:solidFill>
+            <a:srgbClr val="FF0000"/>
+          </a:solidFill>
+          <a:ln>
             <a:solidFill>
               <a:srgbClr val="FF0000"/>
             </a:solidFill>
-            <a:ln>
-              <a:solidFill>
-                <a:srgbClr val="FF0000"/>
-              </a:solidFill>
-            </a:ln>
-          </p:spPr>
-          <p:style>
-            <a:lnRef idx="2">
-              <a:schemeClr val="accent2"/>
-            </a:lnRef>
-            <a:fillRef idx="1">
-              <a:schemeClr val="lt1"/>
-            </a:fillRef>
-            <a:effectRef idx="0">
-              <a:schemeClr val="accent2"/>
-            </a:effectRef>
-            <a:fontRef idx="minor">
-              <a:schemeClr val="dk1"/>
-            </a:fontRef>
-          </p:style>
-          <p:txBody>
-            <a:bodyPr wrap="none" lIns="0" tIns="0" rIns="0" bIns="18000" rtlCol="0" anchor="ctr"/>
-            <a:lstStyle/>
-            <a:p>
-              <a:pPr algn="ctr"/>
-              <a:r>
-                <a:rPr lang="en-US" sz="1400" dirty="0" smtClean="0">
-                  <a:solidFill>
-                    <a:schemeClr val="bg1"/>
-                  </a:solidFill>
-                  <a:latin typeface="Arial"/>
-                  <a:cs typeface="Arial"/>
-                </a:rPr>
-                <a:t>2</a:t>
-              </a:r>
-              <a:endParaRPr lang="en-US" sz="1400" dirty="0">
+          </a:ln>
+        </p:spPr>
+        <p:style>
+          <a:lnRef idx="2">
+            <a:schemeClr val="accent2"/>
+          </a:lnRef>
+          <a:fillRef idx="1">
+            <a:schemeClr val="lt1"/>
+          </a:fillRef>
+          <a:effectRef idx="0">
+            <a:schemeClr val="accent2"/>
+          </a:effectRef>
+          <a:fontRef idx="minor">
+            <a:schemeClr val="dk1"/>
+          </a:fontRef>
+        </p:style>
+        <p:txBody>
+          <a:bodyPr wrap="none" lIns="0" tIns="0" rIns="0" bIns="18000" rtlCol="0" anchor="ctr"/>
+          <a:lstStyle/>
+          <a:p>
+            <a:pPr algn="ctr"/>
+            <a:r>
+              <a:rPr lang="en-US" sz="1400" dirty="0">
                 <a:solidFill>
                   <a:schemeClr val="bg1"/>
                 </a:solidFill>
                 <a:latin typeface="Arial"/>
                 <a:cs typeface="Arial"/>
-              </a:endParaRPr>
-            </a:p>
-          </p:txBody>
-        </p:sp>
-        <p:sp>
-          <p:nvSpPr>
-            <p:cNvPr id="35" name="Oval 34"/>
-            <p:cNvSpPr>
-              <a:spLocks noChangeAspect="1"/>
-            </p:cNvSpPr>
-            <p:nvPr/>
-          </p:nvSpPr>
-          <p:spPr>
-            <a:xfrm>
-              <a:off x="5952155" y="4540398"/>
-              <a:ext cx="216000" cy="216000"/>
-            </a:xfrm>
-            <a:prstGeom prst="ellipse">
-              <a:avLst/>
-            </a:prstGeom>
+              </a:rPr>
+              <a:t>5</a:t>
+            </a:r>
+          </a:p>
+        </p:txBody>
+      </p:sp>
+      <p:sp>
+        <p:nvSpPr>
+          <p:cNvPr id="33" name="Oval 32"/>
+          <p:cNvSpPr>
+            <a:spLocks noChangeAspect="1"/>
+          </p:cNvSpPr>
+          <p:nvPr/>
+        </p:nvSpPr>
+        <p:spPr>
+          <a:xfrm>
+            <a:off x="6001729" y="2582696"/>
+            <a:ext cx="216000" cy="216000"/>
+          </a:xfrm>
+          <a:prstGeom prst="ellipse">
+            <a:avLst/>
+          </a:prstGeom>
+          <a:solidFill>
+            <a:srgbClr val="FF0000"/>
+          </a:solidFill>
+          <a:ln>
             <a:solidFill>
               <a:srgbClr val="FF0000"/>
             </a:solidFill>
-            <a:ln>
-              <a:solidFill>
-                <a:srgbClr val="FF0000"/>
-              </a:solidFill>
-            </a:ln>
-          </p:spPr>
-          <p:style>
-            <a:lnRef idx="2">
-              <a:schemeClr val="accent2"/>
-            </a:lnRef>
-            <a:fillRef idx="1">
-              <a:schemeClr val="lt1"/>
-            </a:fillRef>
-            <a:effectRef idx="0">
-              <a:schemeClr val="accent2"/>
-            </a:effectRef>
-            <a:fontRef idx="minor">
-              <a:schemeClr val="dk1"/>
-            </a:fontRef>
-          </p:style>
-          <p:txBody>
-            <a:bodyPr wrap="none" lIns="0" tIns="0" rIns="0" bIns="18000" rtlCol="0" anchor="ctr"/>
-            <a:lstStyle/>
-            <a:p>
-              <a:pPr algn="ctr"/>
-              <a:r>
-                <a:rPr lang="en-US" sz="1400" dirty="0" smtClean="0">
-                  <a:solidFill>
-                    <a:schemeClr val="bg1"/>
-                  </a:solidFill>
-                  <a:latin typeface="Arial"/>
-                  <a:cs typeface="Arial"/>
-                </a:rPr>
-                <a:t>4</a:t>
-              </a:r>
-              <a:endParaRPr lang="en-US" sz="1400" dirty="0">
+          </a:ln>
+        </p:spPr>
+        <p:style>
+          <a:lnRef idx="2">
+            <a:schemeClr val="accent2"/>
+          </a:lnRef>
+          <a:fillRef idx="1">
+            <a:schemeClr val="lt1"/>
+          </a:fillRef>
+          <a:effectRef idx="0">
+            <a:schemeClr val="accent2"/>
+          </a:effectRef>
+          <a:fontRef idx="minor">
+            <a:schemeClr val="dk1"/>
+          </a:fontRef>
+        </p:style>
+        <p:txBody>
+          <a:bodyPr wrap="none" lIns="0" tIns="0" rIns="0" bIns="18000" rtlCol="0" anchor="ctr"/>
+          <a:lstStyle/>
+          <a:p>
+            <a:pPr algn="ctr"/>
+            <a:r>
+              <a:rPr lang="en-US" sz="1400" dirty="0" smtClean="0">
                 <a:solidFill>
                   <a:schemeClr val="bg1"/>
                 </a:solidFill>
                 <a:latin typeface="Arial"/>
                 <a:cs typeface="Arial"/>
-              </a:endParaRPr>
-            </a:p>
-          </p:txBody>
-        </p:sp>
-      </p:grpSp>
+              </a:rPr>
+              <a:t>3</a:t>
+            </a:r>
+            <a:endParaRPr lang="en-US" sz="1400" dirty="0">
+              <a:solidFill>
+                <a:schemeClr val="bg1"/>
+              </a:solidFill>
+              <a:latin typeface="Arial"/>
+              <a:cs typeface="Arial"/>
+            </a:endParaRPr>
+          </a:p>
+        </p:txBody>
+      </p:sp>
+      <p:sp>
+        <p:nvSpPr>
+          <p:cNvPr id="34" name="Oval 33"/>
+          <p:cNvSpPr>
+            <a:spLocks noChangeAspect="1"/>
+          </p:cNvSpPr>
+          <p:nvPr/>
+        </p:nvSpPr>
+        <p:spPr>
+          <a:xfrm>
+            <a:off x="5293589" y="1511534"/>
+            <a:ext cx="216000" cy="216000"/>
+          </a:xfrm>
+          <a:prstGeom prst="ellipse">
+            <a:avLst/>
+          </a:prstGeom>
+          <a:solidFill>
+            <a:srgbClr val="FF0000"/>
+          </a:solidFill>
+          <a:ln>
+            <a:solidFill>
+              <a:srgbClr val="FF0000"/>
+            </a:solidFill>
+          </a:ln>
+        </p:spPr>
+        <p:style>
+          <a:lnRef idx="2">
+            <a:schemeClr val="accent2"/>
+          </a:lnRef>
+          <a:fillRef idx="1">
+            <a:schemeClr val="lt1"/>
+          </a:fillRef>
+          <a:effectRef idx="0">
+            <a:schemeClr val="accent2"/>
+          </a:effectRef>
+          <a:fontRef idx="minor">
+            <a:schemeClr val="dk1"/>
+          </a:fontRef>
+        </p:style>
+        <p:txBody>
+          <a:bodyPr wrap="none" lIns="0" tIns="0" rIns="0" bIns="18000" rtlCol="0" anchor="ctr"/>
+          <a:lstStyle/>
+          <a:p>
+            <a:pPr algn="ctr"/>
+            <a:r>
+              <a:rPr lang="en-US" sz="1400" dirty="0" smtClean="0">
+                <a:solidFill>
+                  <a:schemeClr val="bg1"/>
+                </a:solidFill>
+                <a:latin typeface="Arial"/>
+                <a:cs typeface="Arial"/>
+              </a:rPr>
+              <a:t>2</a:t>
+            </a:r>
+            <a:endParaRPr lang="en-US" sz="1400" dirty="0">
+              <a:solidFill>
+                <a:schemeClr val="bg1"/>
+              </a:solidFill>
+              <a:latin typeface="Arial"/>
+              <a:cs typeface="Arial"/>
+            </a:endParaRPr>
+          </a:p>
+        </p:txBody>
+      </p:sp>
+      <p:sp>
+        <p:nvSpPr>
+          <p:cNvPr id="35" name="Oval 34"/>
+          <p:cNvSpPr>
+            <a:spLocks noChangeAspect="1"/>
+          </p:cNvSpPr>
+          <p:nvPr/>
+        </p:nvSpPr>
+        <p:spPr>
+          <a:xfrm>
+            <a:off x="5952155" y="4540398"/>
+            <a:ext cx="216000" cy="216000"/>
+          </a:xfrm>
+          <a:prstGeom prst="ellipse">
+            <a:avLst/>
+          </a:prstGeom>
+          <a:solidFill>
+            <a:srgbClr val="FF0000"/>
+          </a:solidFill>
+          <a:ln>
+            <a:solidFill>
+              <a:srgbClr val="FF0000"/>
+            </a:solidFill>
+          </a:ln>
+        </p:spPr>
+        <p:style>
+          <a:lnRef idx="2">
+            <a:schemeClr val="accent2"/>
+          </a:lnRef>
+          <a:fillRef idx="1">
+            <a:schemeClr val="lt1"/>
+          </a:fillRef>
+          <a:effectRef idx="0">
+            <a:schemeClr val="accent2"/>
+          </a:effectRef>
+          <a:fontRef idx="minor">
+            <a:schemeClr val="dk1"/>
+          </a:fontRef>
+        </p:style>
+        <p:txBody>
+          <a:bodyPr wrap="none" lIns="0" tIns="0" rIns="0" bIns="18000" rtlCol="0" anchor="ctr"/>
+          <a:lstStyle/>
+          <a:p>
+            <a:pPr algn="ctr"/>
+            <a:r>
+              <a:rPr lang="en-US" sz="1400" dirty="0" smtClean="0">
+                <a:solidFill>
+                  <a:schemeClr val="bg1"/>
+                </a:solidFill>
+                <a:latin typeface="Arial"/>
+                <a:cs typeface="Arial"/>
+              </a:rPr>
+              <a:t>4</a:t>
+            </a:r>
+            <a:endParaRPr lang="en-US" sz="1400" dirty="0">
+              <a:solidFill>
+                <a:schemeClr val="bg1"/>
+              </a:solidFill>
+              <a:latin typeface="Arial"/>
+              <a:cs typeface="Arial"/>
+            </a:endParaRPr>
+          </a:p>
+        </p:txBody>
+      </p:sp>
       <p:sp>
         <p:nvSpPr>
           <p:cNvPr id="15" name="TextBox 14"/>
@@ -3914,7 +3899,7 @@
         </p:nvCxnSpPr>
         <p:spPr>
           <a:xfrm>
-            <a:off x="6317552" y="1705658"/>
+            <a:off x="6313319" y="1705658"/>
             <a:ext cx="0" cy="72000"/>
           </a:xfrm>
           <a:prstGeom prst="line">
@@ -3945,7 +3930,7 @@
         </p:nvCxnSpPr>
         <p:spPr>
           <a:xfrm>
-            <a:off x="6317552" y="1602290"/>
+            <a:off x="6313319" y="1602290"/>
             <a:ext cx="0" cy="72000"/>
           </a:xfrm>
           <a:prstGeom prst="line">
@@ -3976,7 +3961,7 @@
         </p:nvCxnSpPr>
         <p:spPr>
           <a:xfrm>
-            <a:off x="6317552" y="1395552"/>
+            <a:off x="6313319" y="1395552"/>
             <a:ext cx="0" cy="72000"/>
           </a:xfrm>
           <a:prstGeom prst="line">
@@ -4007,38 +3992,7 @@
         </p:nvCxnSpPr>
         <p:spPr>
           <a:xfrm>
-            <a:off x="6317552" y="1496759"/>
-            <a:ext cx="0" cy="72000"/>
-          </a:xfrm>
-          <a:prstGeom prst="line">
-            <a:avLst/>
-          </a:prstGeom>
-          <a:ln w="38100" cmpd="sng"/>
-        </p:spPr>
-        <p:style>
-          <a:lnRef idx="2">
-            <a:schemeClr val="accent1"/>
-          </a:lnRef>
-          <a:fillRef idx="0">
-            <a:schemeClr val="accent1"/>
-          </a:fillRef>
-          <a:effectRef idx="1">
-            <a:schemeClr val="accent1"/>
-          </a:effectRef>
-          <a:fontRef idx="minor">
-            <a:schemeClr val="tx1"/>
-          </a:fontRef>
-        </p:style>
-      </p:cxnSp>
-      <p:cxnSp>
-        <p:nvCxnSpPr>
-          <p:cNvPr id="106" name="Straight Connector 105"/>
-          <p:cNvCxnSpPr/>
-          <p:nvPr/>
-        </p:nvCxnSpPr>
-        <p:spPr>
-          <a:xfrm>
-            <a:off x="5867606" y="1968924"/>
+            <a:off x="6313319" y="1496759"/>
             <a:ext cx="0" cy="72000"/>
           </a:xfrm>
           <a:prstGeom prst="line">
@@ -4069,7 +4023,7 @@
         </p:nvCxnSpPr>
         <p:spPr>
           <a:xfrm>
-            <a:off x="6317552" y="2067404"/>
+            <a:off x="6313319" y="2067404"/>
             <a:ext cx="0" cy="72000"/>
           </a:xfrm>
           <a:prstGeom prst="line">
@@ -4100,7 +4054,7 @@
         </p:nvCxnSpPr>
         <p:spPr>
           <a:xfrm>
-            <a:off x="6317552" y="1975740"/>
+            <a:off x="6313319" y="1975740"/>
             <a:ext cx="0" cy="72000"/>
           </a:xfrm>
           <a:prstGeom prst="line">
@@ -4131,7 +4085,7 @@
         </p:nvCxnSpPr>
         <p:spPr>
           <a:xfrm>
-            <a:off x="6317552" y="1872371"/>
+            <a:off x="6313319" y="1872371"/>
             <a:ext cx="0" cy="72000"/>
           </a:xfrm>
           <a:prstGeom prst="line">
@@ -4162,7 +4116,7 @@
         </p:nvCxnSpPr>
         <p:spPr>
           <a:xfrm>
-            <a:off x="6317552" y="2870474"/>
+            <a:off x="6313319" y="2870474"/>
             <a:ext cx="0" cy="72000"/>
           </a:xfrm>
           <a:prstGeom prst="line">
@@ -4193,7 +4147,7 @@
         </p:nvCxnSpPr>
         <p:spPr>
           <a:xfrm>
-            <a:off x="6317552" y="2767106"/>
+            <a:off x="6313319" y="2767106"/>
             <a:ext cx="0" cy="72000"/>
           </a:xfrm>
           <a:prstGeom prst="line">
@@ -4224,7 +4178,7 @@
         </p:nvCxnSpPr>
         <p:spPr>
           <a:xfrm>
-            <a:off x="6317552" y="2663737"/>
+            <a:off x="6313319" y="2663737"/>
             <a:ext cx="0" cy="72000"/>
           </a:xfrm>
           <a:prstGeom prst="line">
@@ -4255,7 +4209,7 @@
         </p:nvCxnSpPr>
         <p:spPr>
           <a:xfrm>
-            <a:off x="6317552" y="2560368"/>
+            <a:off x="6313319" y="2560368"/>
             <a:ext cx="0" cy="72000"/>
           </a:xfrm>
           <a:prstGeom prst="line">
@@ -4286,7 +4240,7 @@
         </p:nvCxnSpPr>
         <p:spPr>
           <a:xfrm>
-            <a:off x="6317552" y="2456999"/>
+            <a:off x="6313319" y="2456999"/>
             <a:ext cx="0" cy="72000"/>
           </a:xfrm>
           <a:prstGeom prst="line">
@@ -4317,69 +4271,7 @@
         </p:nvCxnSpPr>
         <p:spPr>
           <a:xfrm>
-            <a:off x="6317552" y="3452795"/>
-            <a:ext cx="0" cy="72000"/>
-          </a:xfrm>
-          <a:prstGeom prst="line">
-            <a:avLst/>
-          </a:prstGeom>
-          <a:ln w="38100" cmpd="sng"/>
-        </p:spPr>
-        <p:style>
-          <a:lnRef idx="2">
-            <a:schemeClr val="accent1"/>
-          </a:lnRef>
-          <a:fillRef idx="0">
-            <a:schemeClr val="accent1"/>
-          </a:fillRef>
-          <a:effectRef idx="1">
-            <a:schemeClr val="accent1"/>
-          </a:effectRef>
-          <a:fontRef idx="minor">
-            <a:schemeClr val="tx1"/>
-          </a:fontRef>
-        </p:style>
-      </p:cxnSp>
-      <p:cxnSp>
-        <p:nvCxnSpPr>
-          <p:cNvPr id="119" name="Straight Connector 118"/>
-          <p:cNvCxnSpPr/>
-          <p:nvPr/>
-        </p:nvCxnSpPr>
-        <p:spPr>
-          <a:xfrm>
-            <a:off x="6317552" y="3349427"/>
-            <a:ext cx="0" cy="72000"/>
-          </a:xfrm>
-          <a:prstGeom prst="line">
-            <a:avLst/>
-          </a:prstGeom>
-          <a:ln w="38100" cmpd="sng"/>
-        </p:spPr>
-        <p:style>
-          <a:lnRef idx="2">
-            <a:schemeClr val="accent1"/>
-          </a:lnRef>
-          <a:fillRef idx="0">
-            <a:schemeClr val="accent1"/>
-          </a:fillRef>
-          <a:effectRef idx="1">
-            <a:schemeClr val="accent1"/>
-          </a:effectRef>
-          <a:fontRef idx="minor">
-            <a:schemeClr val="tx1"/>
-          </a:fontRef>
-        </p:style>
-      </p:cxnSp>
-      <p:cxnSp>
-        <p:nvCxnSpPr>
-          <p:cNvPr id="121" name="Straight Connector 120"/>
-          <p:cNvCxnSpPr/>
-          <p:nvPr/>
-        </p:nvCxnSpPr>
-        <p:spPr>
-          <a:xfrm>
-            <a:off x="6317552" y="3253501"/>
+            <a:off x="5817445" y="1944371"/>
             <a:ext cx="0" cy="72000"/>
           </a:xfrm>
           <a:prstGeom prst="line">
@@ -4410,7 +4302,7 @@
         </p:nvCxnSpPr>
         <p:spPr>
           <a:xfrm>
-            <a:off x="6671652" y="3480141"/>
+            <a:off x="6696953" y="3480141"/>
             <a:ext cx="0" cy="72000"/>
           </a:xfrm>
           <a:prstGeom prst="line">
@@ -4441,7 +4333,7 @@
         </p:nvCxnSpPr>
         <p:spPr>
           <a:xfrm>
-            <a:off x="6671652" y="3376773"/>
+            <a:off x="6696953" y="3376773"/>
             <a:ext cx="0" cy="72000"/>
           </a:xfrm>
           <a:prstGeom prst="line">
@@ -4466,13 +4358,13 @@
       </p:cxnSp>
       <p:cxnSp>
         <p:nvCxnSpPr>
-          <p:cNvPr id="125" name="Straight Connector 124"/>
+          <p:cNvPr id="145" name="Straight Connector 144"/>
           <p:cNvCxnSpPr/>
           <p:nvPr/>
         </p:nvCxnSpPr>
         <p:spPr>
-          <a:xfrm>
-            <a:off x="6671652" y="1732585"/>
+          <a:xfrm rot="5400000">
+            <a:off x="6218433" y="1057541"/>
             <a:ext cx="0" cy="72000"/>
           </a:xfrm>
           <a:prstGeom prst="line">
@@ -4497,13 +4389,13 @@
       </p:cxnSp>
       <p:cxnSp>
         <p:nvCxnSpPr>
-          <p:cNvPr id="126" name="Straight Connector 125"/>
+          <p:cNvPr id="146" name="Straight Connector 145"/>
           <p:cNvCxnSpPr/>
           <p:nvPr/>
         </p:nvCxnSpPr>
         <p:spPr>
-          <a:xfrm>
-            <a:off x="6671652" y="1629321"/>
+          <a:xfrm rot="5400000">
+            <a:off x="6321697" y="1057541"/>
             <a:ext cx="0" cy="72000"/>
           </a:xfrm>
           <a:prstGeom prst="line">
@@ -4528,13 +4420,13 @@
       </p:cxnSp>
       <p:cxnSp>
         <p:nvCxnSpPr>
-          <p:cNvPr id="127" name="Straight Connector 126"/>
+          <p:cNvPr id="147" name="Straight Connector 146"/>
           <p:cNvCxnSpPr/>
           <p:nvPr/>
         </p:nvCxnSpPr>
         <p:spPr>
-          <a:xfrm>
-            <a:off x="6671652" y="1422793"/>
+          <a:xfrm rot="5400000">
+            <a:off x="6528225" y="1057541"/>
             <a:ext cx="0" cy="72000"/>
           </a:xfrm>
           <a:prstGeom prst="line">
@@ -4559,13 +4451,13 @@
       </p:cxnSp>
       <p:cxnSp>
         <p:nvCxnSpPr>
-          <p:cNvPr id="128" name="Straight Connector 127"/>
+          <p:cNvPr id="148" name="Straight Connector 147"/>
           <p:cNvCxnSpPr/>
           <p:nvPr/>
         </p:nvCxnSpPr>
         <p:spPr>
-          <a:xfrm>
-            <a:off x="6671652" y="1319529"/>
+          <a:xfrm rot="5400000">
+            <a:off x="6631489" y="1057541"/>
             <a:ext cx="0" cy="72000"/>
           </a:xfrm>
           <a:prstGeom prst="line">
@@ -4590,13 +4482,13 @@
       </p:cxnSp>
       <p:cxnSp>
         <p:nvCxnSpPr>
-          <p:cNvPr id="130" name="Straight Connector 129"/>
+          <p:cNvPr id="149" name="Straight Connector 148"/>
           <p:cNvCxnSpPr/>
           <p:nvPr/>
         </p:nvCxnSpPr>
         <p:spPr>
-          <a:xfrm>
-            <a:off x="6671652" y="2042378"/>
+          <a:xfrm rot="5400000">
+            <a:off x="5908640" y="1057541"/>
             <a:ext cx="0" cy="72000"/>
           </a:xfrm>
           <a:prstGeom prst="line">
@@ -4621,13 +4513,13 @@
       </p:cxnSp>
       <p:cxnSp>
         <p:nvCxnSpPr>
-          <p:cNvPr id="131" name="Straight Connector 130"/>
+          <p:cNvPr id="150" name="Straight Connector 149"/>
           <p:cNvCxnSpPr/>
           <p:nvPr/>
         </p:nvCxnSpPr>
         <p:spPr>
-          <a:xfrm>
-            <a:off x="6671652" y="1939113"/>
+          <a:xfrm rot="5400000">
+            <a:off x="6011905" y="1057541"/>
             <a:ext cx="0" cy="72000"/>
           </a:xfrm>
           <a:prstGeom prst="line">
@@ -4652,13 +4544,13 @@
       </p:cxnSp>
       <p:cxnSp>
         <p:nvCxnSpPr>
-          <p:cNvPr id="132" name="Straight Connector 131"/>
+          <p:cNvPr id="151" name="Straight Connector 150"/>
           <p:cNvCxnSpPr/>
           <p:nvPr/>
         </p:nvCxnSpPr>
         <p:spPr>
-          <a:xfrm>
-            <a:off x="6671652" y="1835849"/>
+          <a:xfrm rot="5400000">
+            <a:off x="6115169" y="1057541"/>
             <a:ext cx="0" cy="72000"/>
           </a:xfrm>
           <a:prstGeom prst="line">
@@ -4683,13 +4575,13 @@
       </p:cxnSp>
       <p:cxnSp>
         <p:nvCxnSpPr>
-          <p:cNvPr id="142" name="Straight Connector 141"/>
+          <p:cNvPr id="152" name="Straight Connector 151"/>
           <p:cNvCxnSpPr/>
           <p:nvPr/>
         </p:nvCxnSpPr>
         <p:spPr>
-          <a:xfrm>
-            <a:off x="6671652" y="1526057"/>
+          <a:xfrm rot="5400000">
+            <a:off x="6424961" y="1057541"/>
             <a:ext cx="0" cy="72000"/>
           </a:xfrm>
           <a:prstGeom prst="line">
@@ -4712,269 +4604,6 @@
           </a:fontRef>
         </p:style>
       </p:cxnSp>
-      <p:grpSp>
-        <p:nvGrpSpPr>
-          <p:cNvPr id="144" name="Group 143"/>
-          <p:cNvGrpSpPr/>
-          <p:nvPr/>
-        </p:nvGrpSpPr>
-        <p:grpSpPr>
-          <a:xfrm rot="5400000">
-            <a:off x="7318257" y="3828778"/>
-            <a:ext cx="0" cy="794849"/>
-            <a:chOff x="6671652" y="1319529"/>
-            <a:chExt cx="0" cy="794849"/>
-          </a:xfrm>
-        </p:grpSpPr>
-        <p:cxnSp>
-          <p:nvCxnSpPr>
-            <p:cNvPr id="145" name="Straight Connector 144"/>
-            <p:cNvCxnSpPr/>
-            <p:nvPr/>
-          </p:nvCxnSpPr>
-          <p:spPr>
-            <a:xfrm>
-              <a:off x="6671652" y="1732585"/>
-              <a:ext cx="0" cy="72000"/>
-            </a:xfrm>
-            <a:prstGeom prst="line">
-              <a:avLst/>
-            </a:prstGeom>
-            <a:ln w="38100" cmpd="sng"/>
-          </p:spPr>
-          <p:style>
-            <a:lnRef idx="2">
-              <a:schemeClr val="accent1"/>
-            </a:lnRef>
-            <a:fillRef idx="0">
-              <a:schemeClr val="accent1"/>
-            </a:fillRef>
-            <a:effectRef idx="1">
-              <a:schemeClr val="accent1"/>
-            </a:effectRef>
-            <a:fontRef idx="minor">
-              <a:schemeClr val="tx1"/>
-            </a:fontRef>
-          </p:style>
-        </p:cxnSp>
-        <p:cxnSp>
-          <p:nvCxnSpPr>
-            <p:cNvPr id="146" name="Straight Connector 145"/>
-            <p:cNvCxnSpPr/>
-            <p:nvPr/>
-          </p:nvCxnSpPr>
-          <p:spPr>
-            <a:xfrm>
-              <a:off x="6671652" y="1629321"/>
-              <a:ext cx="0" cy="72000"/>
-            </a:xfrm>
-            <a:prstGeom prst="line">
-              <a:avLst/>
-            </a:prstGeom>
-            <a:ln w="38100" cmpd="sng"/>
-          </p:spPr>
-          <p:style>
-            <a:lnRef idx="2">
-              <a:schemeClr val="accent1"/>
-            </a:lnRef>
-            <a:fillRef idx="0">
-              <a:schemeClr val="accent1"/>
-            </a:fillRef>
-            <a:effectRef idx="1">
-              <a:schemeClr val="accent1"/>
-            </a:effectRef>
-            <a:fontRef idx="minor">
-              <a:schemeClr val="tx1"/>
-            </a:fontRef>
-          </p:style>
-        </p:cxnSp>
-        <p:cxnSp>
-          <p:nvCxnSpPr>
-            <p:cNvPr id="147" name="Straight Connector 146"/>
-            <p:cNvCxnSpPr/>
-            <p:nvPr/>
-          </p:nvCxnSpPr>
-          <p:spPr>
-            <a:xfrm>
-              <a:off x="6671652" y="1422793"/>
-              <a:ext cx="0" cy="72000"/>
-            </a:xfrm>
-            <a:prstGeom prst="line">
-              <a:avLst/>
-            </a:prstGeom>
-            <a:ln w="38100" cmpd="sng"/>
-          </p:spPr>
-          <p:style>
-            <a:lnRef idx="2">
-              <a:schemeClr val="accent1"/>
-            </a:lnRef>
-            <a:fillRef idx="0">
-              <a:schemeClr val="accent1"/>
-            </a:fillRef>
-            <a:effectRef idx="1">
-              <a:schemeClr val="accent1"/>
-            </a:effectRef>
-            <a:fontRef idx="minor">
-              <a:schemeClr val="tx1"/>
-            </a:fontRef>
-          </p:style>
-        </p:cxnSp>
-        <p:cxnSp>
-          <p:nvCxnSpPr>
-            <p:cNvPr id="148" name="Straight Connector 147"/>
-            <p:cNvCxnSpPr/>
-            <p:nvPr/>
-          </p:nvCxnSpPr>
-          <p:spPr>
-            <a:xfrm>
-              <a:off x="6671652" y="1319529"/>
-              <a:ext cx="0" cy="72000"/>
-            </a:xfrm>
-            <a:prstGeom prst="line">
-              <a:avLst/>
-            </a:prstGeom>
-            <a:ln w="38100" cmpd="sng"/>
-          </p:spPr>
-          <p:style>
-            <a:lnRef idx="2">
-              <a:schemeClr val="accent1"/>
-            </a:lnRef>
-            <a:fillRef idx="0">
-              <a:schemeClr val="accent1"/>
-            </a:fillRef>
-            <a:effectRef idx="1">
-              <a:schemeClr val="accent1"/>
-            </a:effectRef>
-            <a:fontRef idx="minor">
-              <a:schemeClr val="tx1"/>
-            </a:fontRef>
-          </p:style>
-        </p:cxnSp>
-        <p:cxnSp>
-          <p:nvCxnSpPr>
-            <p:cNvPr id="149" name="Straight Connector 148"/>
-            <p:cNvCxnSpPr/>
-            <p:nvPr/>
-          </p:nvCxnSpPr>
-          <p:spPr>
-            <a:xfrm>
-              <a:off x="6671652" y="2042378"/>
-              <a:ext cx="0" cy="72000"/>
-            </a:xfrm>
-            <a:prstGeom prst="line">
-              <a:avLst/>
-            </a:prstGeom>
-            <a:ln w="38100" cmpd="sng"/>
-          </p:spPr>
-          <p:style>
-            <a:lnRef idx="2">
-              <a:schemeClr val="accent1"/>
-            </a:lnRef>
-            <a:fillRef idx="0">
-              <a:schemeClr val="accent1"/>
-            </a:fillRef>
-            <a:effectRef idx="1">
-              <a:schemeClr val="accent1"/>
-            </a:effectRef>
-            <a:fontRef idx="minor">
-              <a:schemeClr val="tx1"/>
-            </a:fontRef>
-          </p:style>
-        </p:cxnSp>
-        <p:cxnSp>
-          <p:nvCxnSpPr>
-            <p:cNvPr id="150" name="Straight Connector 149"/>
-            <p:cNvCxnSpPr/>
-            <p:nvPr/>
-          </p:nvCxnSpPr>
-          <p:spPr>
-            <a:xfrm>
-              <a:off x="6671652" y="1939113"/>
-              <a:ext cx="0" cy="72000"/>
-            </a:xfrm>
-            <a:prstGeom prst="line">
-              <a:avLst/>
-            </a:prstGeom>
-            <a:ln w="38100" cmpd="sng"/>
-          </p:spPr>
-          <p:style>
-            <a:lnRef idx="2">
-              <a:schemeClr val="accent1"/>
-            </a:lnRef>
-            <a:fillRef idx="0">
-              <a:schemeClr val="accent1"/>
-            </a:fillRef>
-            <a:effectRef idx="1">
-              <a:schemeClr val="accent1"/>
-            </a:effectRef>
-            <a:fontRef idx="minor">
-              <a:schemeClr val="tx1"/>
-            </a:fontRef>
-          </p:style>
-        </p:cxnSp>
-        <p:cxnSp>
-          <p:nvCxnSpPr>
-            <p:cNvPr id="151" name="Straight Connector 150"/>
-            <p:cNvCxnSpPr/>
-            <p:nvPr/>
-          </p:nvCxnSpPr>
-          <p:spPr>
-            <a:xfrm>
-              <a:off x="6671652" y="1835849"/>
-              <a:ext cx="0" cy="72000"/>
-            </a:xfrm>
-            <a:prstGeom prst="line">
-              <a:avLst/>
-            </a:prstGeom>
-            <a:ln w="38100" cmpd="sng"/>
-          </p:spPr>
-          <p:style>
-            <a:lnRef idx="2">
-              <a:schemeClr val="accent1"/>
-            </a:lnRef>
-            <a:fillRef idx="0">
-              <a:schemeClr val="accent1"/>
-            </a:fillRef>
-            <a:effectRef idx="1">
-              <a:schemeClr val="accent1"/>
-            </a:effectRef>
-            <a:fontRef idx="minor">
-              <a:schemeClr val="tx1"/>
-            </a:fontRef>
-          </p:style>
-        </p:cxnSp>
-        <p:cxnSp>
-          <p:nvCxnSpPr>
-            <p:cNvPr id="152" name="Straight Connector 151"/>
-            <p:cNvCxnSpPr/>
-            <p:nvPr/>
-          </p:nvCxnSpPr>
-          <p:spPr>
-            <a:xfrm>
-              <a:off x="6671652" y="1526057"/>
-              <a:ext cx="0" cy="72000"/>
-            </a:xfrm>
-            <a:prstGeom prst="line">
-              <a:avLst/>
-            </a:prstGeom>
-            <a:ln w="38100" cmpd="sng"/>
-          </p:spPr>
-          <p:style>
-            <a:lnRef idx="2">
-              <a:schemeClr val="accent1"/>
-            </a:lnRef>
-            <a:fillRef idx="0">
-              <a:schemeClr val="accent1"/>
-            </a:fillRef>
-            <a:effectRef idx="1">
-              <a:schemeClr val="accent1"/>
-            </a:effectRef>
-            <a:fontRef idx="minor">
-              <a:schemeClr val="tx1"/>
-            </a:fontRef>
-          </p:style>
-        </p:cxnSp>
-      </p:grpSp>
       <p:cxnSp>
         <p:nvCxnSpPr>
           <p:cNvPr id="155" name="Straight Connector 154"/>
@@ -4983,7 +4612,7 @@
         </p:nvCxnSpPr>
         <p:spPr>
           <a:xfrm>
-            <a:off x="6671652" y="3909712"/>
+            <a:off x="6696953" y="3909712"/>
             <a:ext cx="0" cy="72000"/>
           </a:xfrm>
           <a:prstGeom prst="line">
@@ -5014,7 +4643,7 @@
         </p:nvCxnSpPr>
         <p:spPr>
           <a:xfrm>
-            <a:off x="6671652" y="3703184"/>
+            <a:off x="6696953" y="3703184"/>
             <a:ext cx="0" cy="72000"/>
           </a:xfrm>
           <a:prstGeom prst="line">
@@ -5045,7 +4674,7 @@
         </p:nvCxnSpPr>
         <p:spPr>
           <a:xfrm>
-            <a:off x="6671652" y="3599920"/>
+            <a:off x="6696953" y="3599920"/>
             <a:ext cx="0" cy="72000"/>
           </a:xfrm>
           <a:prstGeom prst="line">
@@ -5076,7 +4705,7 @@
         </p:nvCxnSpPr>
         <p:spPr>
           <a:xfrm>
-            <a:off x="6671652" y="3806448"/>
+            <a:off x="6696953" y="3806448"/>
             <a:ext cx="0" cy="72000"/>
           </a:xfrm>
           <a:prstGeom prst="line">
@@ -5107,7 +4736,7 @@
         </p:nvCxnSpPr>
         <p:spPr>
           <a:xfrm>
-            <a:off x="5867030" y="2310965"/>
+            <a:off x="5817445" y="2310965"/>
             <a:ext cx="0" cy="72000"/>
           </a:xfrm>
           <a:prstGeom prst="line">
@@ -5138,503 +4767,7 @@
         </p:nvCxnSpPr>
         <p:spPr>
           <a:xfrm>
-            <a:off x="5867030" y="2207701"/>
-            <a:ext cx="0" cy="72000"/>
-          </a:xfrm>
-          <a:prstGeom prst="line">
-            <a:avLst/>
-          </a:prstGeom>
-          <a:ln w="38100" cmpd="sng"/>
-        </p:spPr>
-        <p:style>
-          <a:lnRef idx="2">
-            <a:schemeClr val="accent1"/>
-          </a:lnRef>
-          <a:fillRef idx="0">
-            <a:schemeClr val="accent1"/>
-          </a:fillRef>
-          <a:effectRef idx="1">
-            <a:schemeClr val="accent1"/>
-          </a:effectRef>
-          <a:fontRef idx="minor">
-            <a:schemeClr val="tx1"/>
-          </a:fontRef>
-        </p:style>
-      </p:cxnSp>
-      <p:cxnSp>
-        <p:nvCxnSpPr>
-          <p:cNvPr id="184" name="Straight Connector 183"/>
-          <p:cNvCxnSpPr/>
-          <p:nvPr/>
-        </p:nvCxnSpPr>
-        <p:spPr>
-          <a:xfrm>
-            <a:off x="6361814" y="1705706"/>
-            <a:ext cx="0" cy="72000"/>
-          </a:xfrm>
-          <a:prstGeom prst="line">
-            <a:avLst/>
-          </a:prstGeom>
-          <a:ln w="38100" cmpd="sng"/>
-        </p:spPr>
-        <p:style>
-          <a:lnRef idx="2">
-            <a:schemeClr val="accent1"/>
-          </a:lnRef>
-          <a:fillRef idx="0">
-            <a:schemeClr val="accent1"/>
-          </a:fillRef>
-          <a:effectRef idx="1">
-            <a:schemeClr val="accent1"/>
-          </a:effectRef>
-          <a:fontRef idx="minor">
-            <a:schemeClr val="tx1"/>
-          </a:fontRef>
-        </p:style>
-      </p:cxnSp>
-      <p:cxnSp>
-        <p:nvCxnSpPr>
-          <p:cNvPr id="185" name="Straight Connector 184"/>
-          <p:cNvCxnSpPr/>
-          <p:nvPr/>
-        </p:nvCxnSpPr>
-        <p:spPr>
-          <a:xfrm>
-            <a:off x="6361814" y="1602338"/>
-            <a:ext cx="0" cy="72000"/>
-          </a:xfrm>
-          <a:prstGeom prst="line">
-            <a:avLst/>
-          </a:prstGeom>
-          <a:ln w="38100" cmpd="sng"/>
-        </p:spPr>
-        <p:style>
-          <a:lnRef idx="2">
-            <a:schemeClr val="accent1"/>
-          </a:lnRef>
-          <a:fillRef idx="0">
-            <a:schemeClr val="accent1"/>
-          </a:fillRef>
-          <a:effectRef idx="1">
-            <a:schemeClr val="accent1"/>
-          </a:effectRef>
-          <a:fontRef idx="minor">
-            <a:schemeClr val="tx1"/>
-          </a:fontRef>
-        </p:style>
-      </p:cxnSp>
-      <p:cxnSp>
-        <p:nvCxnSpPr>
-          <p:cNvPr id="186" name="Straight Connector 185"/>
-          <p:cNvCxnSpPr/>
-          <p:nvPr/>
-        </p:nvCxnSpPr>
-        <p:spPr>
-          <a:xfrm>
-            <a:off x="6361814" y="1395600"/>
-            <a:ext cx="0" cy="72000"/>
-          </a:xfrm>
-          <a:prstGeom prst="line">
-            <a:avLst/>
-          </a:prstGeom>
-          <a:ln w="38100" cmpd="sng"/>
-        </p:spPr>
-        <p:style>
-          <a:lnRef idx="2">
-            <a:schemeClr val="accent1"/>
-          </a:lnRef>
-          <a:fillRef idx="0">
-            <a:schemeClr val="accent1"/>
-          </a:fillRef>
-          <a:effectRef idx="1">
-            <a:schemeClr val="accent1"/>
-          </a:effectRef>
-          <a:fontRef idx="minor">
-            <a:schemeClr val="tx1"/>
-          </a:fontRef>
-        </p:style>
-      </p:cxnSp>
-      <p:cxnSp>
-        <p:nvCxnSpPr>
-          <p:cNvPr id="187" name="Straight Connector 186"/>
-          <p:cNvCxnSpPr/>
-          <p:nvPr/>
-        </p:nvCxnSpPr>
-        <p:spPr>
-          <a:xfrm>
-            <a:off x="6361814" y="1496807"/>
-            <a:ext cx="0" cy="72000"/>
-          </a:xfrm>
-          <a:prstGeom prst="line">
-            <a:avLst/>
-          </a:prstGeom>
-          <a:ln w="38100" cmpd="sng"/>
-        </p:spPr>
-        <p:style>
-          <a:lnRef idx="2">
-            <a:schemeClr val="accent1"/>
-          </a:lnRef>
-          <a:fillRef idx="0">
-            <a:schemeClr val="accent1"/>
-          </a:fillRef>
-          <a:effectRef idx="1">
-            <a:schemeClr val="accent1"/>
-          </a:effectRef>
-          <a:fontRef idx="minor">
-            <a:schemeClr val="tx1"/>
-          </a:fontRef>
-        </p:style>
-      </p:cxnSp>
-      <p:cxnSp>
-        <p:nvCxnSpPr>
-          <p:cNvPr id="188" name="Straight Connector 187"/>
-          <p:cNvCxnSpPr/>
-          <p:nvPr/>
-        </p:nvCxnSpPr>
-        <p:spPr>
-          <a:xfrm>
-            <a:off x="5867606" y="1877308"/>
-            <a:ext cx="0" cy="72000"/>
-          </a:xfrm>
-          <a:prstGeom prst="line">
-            <a:avLst/>
-          </a:prstGeom>
-          <a:ln w="38100" cmpd="sng"/>
-        </p:spPr>
-        <p:style>
-          <a:lnRef idx="2">
-            <a:schemeClr val="accent1"/>
-          </a:lnRef>
-          <a:fillRef idx="0">
-            <a:schemeClr val="accent1"/>
-          </a:fillRef>
-          <a:effectRef idx="1">
-            <a:schemeClr val="accent1"/>
-          </a:effectRef>
-          <a:fontRef idx="minor">
-            <a:schemeClr val="tx1"/>
-          </a:fontRef>
-        </p:style>
-      </p:cxnSp>
-      <p:cxnSp>
-        <p:nvCxnSpPr>
-          <p:cNvPr id="189" name="Straight Connector 188"/>
-          <p:cNvCxnSpPr/>
-          <p:nvPr/>
-        </p:nvCxnSpPr>
-        <p:spPr>
-          <a:xfrm>
-            <a:off x="6361814" y="2067452"/>
-            <a:ext cx="0" cy="72000"/>
-          </a:xfrm>
-          <a:prstGeom prst="line">
-            <a:avLst/>
-          </a:prstGeom>
-          <a:ln w="38100" cmpd="sng"/>
-        </p:spPr>
-        <p:style>
-          <a:lnRef idx="2">
-            <a:schemeClr val="accent1"/>
-          </a:lnRef>
-          <a:fillRef idx="0">
-            <a:schemeClr val="accent1"/>
-          </a:fillRef>
-          <a:effectRef idx="1">
-            <a:schemeClr val="accent1"/>
-          </a:effectRef>
-          <a:fontRef idx="minor">
-            <a:schemeClr val="tx1"/>
-          </a:fontRef>
-        </p:style>
-      </p:cxnSp>
-      <p:cxnSp>
-        <p:nvCxnSpPr>
-          <p:cNvPr id="190" name="Straight Connector 189"/>
-          <p:cNvCxnSpPr/>
-          <p:nvPr/>
-        </p:nvCxnSpPr>
-        <p:spPr>
-          <a:xfrm>
-            <a:off x="6361814" y="1975788"/>
-            <a:ext cx="0" cy="72000"/>
-          </a:xfrm>
-          <a:prstGeom prst="line">
-            <a:avLst/>
-          </a:prstGeom>
-          <a:ln w="38100" cmpd="sng"/>
-        </p:spPr>
-        <p:style>
-          <a:lnRef idx="2">
-            <a:schemeClr val="accent1"/>
-          </a:lnRef>
-          <a:fillRef idx="0">
-            <a:schemeClr val="accent1"/>
-          </a:fillRef>
-          <a:effectRef idx="1">
-            <a:schemeClr val="accent1"/>
-          </a:effectRef>
-          <a:fontRef idx="minor">
-            <a:schemeClr val="tx1"/>
-          </a:fontRef>
-        </p:style>
-      </p:cxnSp>
-      <p:cxnSp>
-        <p:nvCxnSpPr>
-          <p:cNvPr id="191" name="Straight Connector 190"/>
-          <p:cNvCxnSpPr/>
-          <p:nvPr/>
-        </p:nvCxnSpPr>
-        <p:spPr>
-          <a:xfrm>
-            <a:off x="6361814" y="1872419"/>
-            <a:ext cx="0" cy="72000"/>
-          </a:xfrm>
-          <a:prstGeom prst="line">
-            <a:avLst/>
-          </a:prstGeom>
-          <a:ln w="38100" cmpd="sng"/>
-        </p:spPr>
-        <p:style>
-          <a:lnRef idx="2">
-            <a:schemeClr val="accent1"/>
-          </a:lnRef>
-          <a:fillRef idx="0">
-            <a:schemeClr val="accent1"/>
-          </a:fillRef>
-          <a:effectRef idx="1">
-            <a:schemeClr val="accent1"/>
-          </a:effectRef>
-          <a:fontRef idx="minor">
-            <a:schemeClr val="tx1"/>
-          </a:fontRef>
-        </p:style>
-      </p:cxnSp>
-      <p:cxnSp>
-        <p:nvCxnSpPr>
-          <p:cNvPr id="192" name="Straight Connector 191"/>
-          <p:cNvCxnSpPr/>
-          <p:nvPr/>
-        </p:nvCxnSpPr>
-        <p:spPr>
-          <a:xfrm>
-            <a:off x="6361814" y="2870522"/>
-            <a:ext cx="0" cy="72000"/>
-          </a:xfrm>
-          <a:prstGeom prst="line">
-            <a:avLst/>
-          </a:prstGeom>
-          <a:ln w="38100" cmpd="sng"/>
-        </p:spPr>
-        <p:style>
-          <a:lnRef idx="2">
-            <a:schemeClr val="accent1"/>
-          </a:lnRef>
-          <a:fillRef idx="0">
-            <a:schemeClr val="accent1"/>
-          </a:fillRef>
-          <a:effectRef idx="1">
-            <a:schemeClr val="accent1"/>
-          </a:effectRef>
-          <a:fontRef idx="minor">
-            <a:schemeClr val="tx1"/>
-          </a:fontRef>
-        </p:style>
-      </p:cxnSp>
-      <p:cxnSp>
-        <p:nvCxnSpPr>
-          <p:cNvPr id="193" name="Straight Connector 192"/>
-          <p:cNvCxnSpPr/>
-          <p:nvPr/>
-        </p:nvCxnSpPr>
-        <p:spPr>
-          <a:xfrm>
-            <a:off x="6361814" y="2767154"/>
-            <a:ext cx="0" cy="72000"/>
-          </a:xfrm>
-          <a:prstGeom prst="line">
-            <a:avLst/>
-          </a:prstGeom>
-          <a:ln w="38100" cmpd="sng"/>
-        </p:spPr>
-        <p:style>
-          <a:lnRef idx="2">
-            <a:schemeClr val="accent1"/>
-          </a:lnRef>
-          <a:fillRef idx="0">
-            <a:schemeClr val="accent1"/>
-          </a:fillRef>
-          <a:effectRef idx="1">
-            <a:schemeClr val="accent1"/>
-          </a:effectRef>
-          <a:fontRef idx="minor">
-            <a:schemeClr val="tx1"/>
-          </a:fontRef>
-        </p:style>
-      </p:cxnSp>
-      <p:cxnSp>
-        <p:nvCxnSpPr>
-          <p:cNvPr id="194" name="Straight Connector 193"/>
-          <p:cNvCxnSpPr/>
-          <p:nvPr/>
-        </p:nvCxnSpPr>
-        <p:spPr>
-          <a:xfrm>
-            <a:off x="6361814" y="2663785"/>
-            <a:ext cx="0" cy="72000"/>
-          </a:xfrm>
-          <a:prstGeom prst="line">
-            <a:avLst/>
-          </a:prstGeom>
-          <a:ln w="38100" cmpd="sng"/>
-        </p:spPr>
-        <p:style>
-          <a:lnRef idx="2">
-            <a:schemeClr val="accent1"/>
-          </a:lnRef>
-          <a:fillRef idx="0">
-            <a:schemeClr val="accent1"/>
-          </a:fillRef>
-          <a:effectRef idx="1">
-            <a:schemeClr val="accent1"/>
-          </a:effectRef>
-          <a:fontRef idx="minor">
-            <a:schemeClr val="tx1"/>
-          </a:fontRef>
-        </p:style>
-      </p:cxnSp>
-      <p:cxnSp>
-        <p:nvCxnSpPr>
-          <p:cNvPr id="195" name="Straight Connector 194"/>
-          <p:cNvCxnSpPr/>
-          <p:nvPr/>
-        </p:nvCxnSpPr>
-        <p:spPr>
-          <a:xfrm>
-            <a:off x="6361814" y="2560416"/>
-            <a:ext cx="0" cy="72000"/>
-          </a:xfrm>
-          <a:prstGeom prst="line">
-            <a:avLst/>
-          </a:prstGeom>
-          <a:ln w="38100" cmpd="sng"/>
-        </p:spPr>
-        <p:style>
-          <a:lnRef idx="2">
-            <a:schemeClr val="accent1"/>
-          </a:lnRef>
-          <a:fillRef idx="0">
-            <a:schemeClr val="accent1"/>
-          </a:fillRef>
-          <a:effectRef idx="1">
-            <a:schemeClr val="accent1"/>
-          </a:effectRef>
-          <a:fontRef idx="minor">
-            <a:schemeClr val="tx1"/>
-          </a:fontRef>
-        </p:style>
-      </p:cxnSp>
-      <p:cxnSp>
-        <p:nvCxnSpPr>
-          <p:cNvPr id="196" name="Straight Connector 195"/>
-          <p:cNvCxnSpPr/>
-          <p:nvPr/>
-        </p:nvCxnSpPr>
-        <p:spPr>
-          <a:xfrm>
-            <a:off x="6361814" y="2457047"/>
-            <a:ext cx="0" cy="72000"/>
-          </a:xfrm>
-          <a:prstGeom prst="line">
-            <a:avLst/>
-          </a:prstGeom>
-          <a:ln w="38100" cmpd="sng"/>
-        </p:spPr>
-        <p:style>
-          <a:lnRef idx="2">
-            <a:schemeClr val="accent1"/>
-          </a:lnRef>
-          <a:fillRef idx="0">
-            <a:schemeClr val="accent1"/>
-          </a:fillRef>
-          <a:effectRef idx="1">
-            <a:schemeClr val="accent1"/>
-          </a:effectRef>
-          <a:fontRef idx="minor">
-            <a:schemeClr val="tx1"/>
-          </a:fontRef>
-        </p:style>
-      </p:cxnSp>
-      <p:cxnSp>
-        <p:nvCxnSpPr>
-          <p:cNvPr id="197" name="Straight Connector 196"/>
-          <p:cNvCxnSpPr/>
-          <p:nvPr/>
-        </p:nvCxnSpPr>
-        <p:spPr>
-          <a:xfrm>
-            <a:off x="6361814" y="3452843"/>
-            <a:ext cx="0" cy="72000"/>
-          </a:xfrm>
-          <a:prstGeom prst="line">
-            <a:avLst/>
-          </a:prstGeom>
-          <a:ln w="38100" cmpd="sng"/>
-        </p:spPr>
-        <p:style>
-          <a:lnRef idx="2">
-            <a:schemeClr val="accent1"/>
-          </a:lnRef>
-          <a:fillRef idx="0">
-            <a:schemeClr val="accent1"/>
-          </a:fillRef>
-          <a:effectRef idx="1">
-            <a:schemeClr val="accent1"/>
-          </a:effectRef>
-          <a:fontRef idx="minor">
-            <a:schemeClr val="tx1"/>
-          </a:fontRef>
-        </p:style>
-      </p:cxnSp>
-      <p:cxnSp>
-        <p:nvCxnSpPr>
-          <p:cNvPr id="198" name="Straight Connector 197"/>
-          <p:cNvCxnSpPr/>
-          <p:nvPr/>
-        </p:nvCxnSpPr>
-        <p:spPr>
-          <a:xfrm>
-            <a:off x="6361814" y="3349475"/>
-            <a:ext cx="0" cy="72000"/>
-          </a:xfrm>
-          <a:prstGeom prst="line">
-            <a:avLst/>
-          </a:prstGeom>
-          <a:ln w="38100" cmpd="sng"/>
-        </p:spPr>
-        <p:style>
-          <a:lnRef idx="2">
-            <a:schemeClr val="accent1"/>
-          </a:lnRef>
-          <a:fillRef idx="0">
-            <a:schemeClr val="accent1"/>
-          </a:fillRef>
-          <a:effectRef idx="1">
-            <a:schemeClr val="accent1"/>
-          </a:effectRef>
-          <a:fontRef idx="minor">
-            <a:schemeClr val="tx1"/>
-          </a:fontRef>
-        </p:style>
-      </p:cxnSp>
-      <p:cxnSp>
-        <p:nvCxnSpPr>
-          <p:cNvPr id="199" name="Straight Connector 198"/>
-          <p:cNvCxnSpPr/>
-          <p:nvPr/>
-        </p:nvCxnSpPr>
-        <p:spPr>
-          <a:xfrm>
-            <a:off x="6361814" y="3253549"/>
+            <a:off x="5817445" y="2207701"/>
             <a:ext cx="0" cy="72000"/>
           </a:xfrm>
           <a:prstGeom prst="line">
@@ -5665,7 +4798,7 @@
         </p:nvCxnSpPr>
         <p:spPr>
           <a:xfrm>
-            <a:off x="6671652" y="3277427"/>
+            <a:off x="6696953" y="3277427"/>
             <a:ext cx="0" cy="72000"/>
           </a:xfrm>
           <a:prstGeom prst="line">
@@ -5696,7 +4829,7 @@
         </p:nvCxnSpPr>
         <p:spPr>
           <a:xfrm>
-            <a:off x="5867606" y="2619686"/>
+            <a:off x="5817445" y="2619686"/>
             <a:ext cx="0" cy="72000"/>
           </a:xfrm>
           <a:prstGeom prst="line">
@@ -5727,7 +4860,7 @@
         </p:nvCxnSpPr>
         <p:spPr>
           <a:xfrm>
-            <a:off x="5867606" y="2516422"/>
+            <a:off x="5817445" y="2516422"/>
             <a:ext cx="0" cy="72000"/>
           </a:xfrm>
           <a:prstGeom prst="line">
@@ -5758,7 +4891,7 @@
         </p:nvCxnSpPr>
         <p:spPr>
           <a:xfrm>
-            <a:off x="5867606" y="2413158"/>
+            <a:off x="5817445" y="2413158"/>
             <a:ext cx="0" cy="72000"/>
           </a:xfrm>
           <a:prstGeom prst="line">
@@ -5931,6 +5064,626 @@
           </a:p>
         </p:txBody>
       </p:sp>
+      <p:cxnSp>
+        <p:nvCxnSpPr>
+          <p:cNvPr id="84" name="Straight Connector 83"/>
+          <p:cNvCxnSpPr/>
+          <p:nvPr/>
+        </p:nvCxnSpPr>
+        <p:spPr>
+          <a:xfrm>
+            <a:off x="5817445" y="1498816"/>
+            <a:ext cx="0" cy="72000"/>
+          </a:xfrm>
+          <a:prstGeom prst="line">
+            <a:avLst/>
+          </a:prstGeom>
+          <a:ln w="38100" cmpd="sng"/>
+        </p:spPr>
+        <p:style>
+          <a:lnRef idx="2">
+            <a:schemeClr val="accent1"/>
+          </a:lnRef>
+          <a:fillRef idx="0">
+            <a:schemeClr val="accent1"/>
+          </a:fillRef>
+          <a:effectRef idx="1">
+            <a:schemeClr val="accent1"/>
+          </a:effectRef>
+          <a:fontRef idx="minor">
+            <a:schemeClr val="tx1"/>
+          </a:fontRef>
+        </p:style>
+      </p:cxnSp>
+      <p:cxnSp>
+        <p:nvCxnSpPr>
+          <p:cNvPr id="85" name="Straight Connector 84"/>
+          <p:cNvCxnSpPr/>
+          <p:nvPr/>
+        </p:nvCxnSpPr>
+        <p:spPr>
+          <a:xfrm>
+            <a:off x="5817445" y="1292288"/>
+            <a:ext cx="0" cy="72000"/>
+          </a:xfrm>
+          <a:prstGeom prst="line">
+            <a:avLst/>
+          </a:prstGeom>
+          <a:ln w="38100" cmpd="sng"/>
+        </p:spPr>
+        <p:style>
+          <a:lnRef idx="2">
+            <a:schemeClr val="accent1"/>
+          </a:lnRef>
+          <a:fillRef idx="0">
+            <a:schemeClr val="accent1"/>
+          </a:fillRef>
+          <a:effectRef idx="1">
+            <a:schemeClr val="accent1"/>
+          </a:effectRef>
+          <a:fontRef idx="minor">
+            <a:schemeClr val="tx1"/>
+          </a:fontRef>
+        </p:style>
+      </p:cxnSp>
+      <p:cxnSp>
+        <p:nvCxnSpPr>
+          <p:cNvPr id="86" name="Straight Connector 85"/>
+          <p:cNvCxnSpPr/>
+          <p:nvPr/>
+        </p:nvCxnSpPr>
+        <p:spPr>
+          <a:xfrm>
+            <a:off x="5817445" y="1189024"/>
+            <a:ext cx="0" cy="72000"/>
+          </a:xfrm>
+          <a:prstGeom prst="line">
+            <a:avLst/>
+          </a:prstGeom>
+          <a:ln w="38100" cmpd="sng"/>
+        </p:spPr>
+        <p:style>
+          <a:lnRef idx="2">
+            <a:schemeClr val="accent1"/>
+          </a:lnRef>
+          <a:fillRef idx="0">
+            <a:schemeClr val="accent1"/>
+          </a:fillRef>
+          <a:effectRef idx="1">
+            <a:schemeClr val="accent1"/>
+          </a:effectRef>
+          <a:fontRef idx="minor">
+            <a:schemeClr val="tx1"/>
+          </a:fontRef>
+        </p:style>
+      </p:cxnSp>
+      <p:cxnSp>
+        <p:nvCxnSpPr>
+          <p:cNvPr id="87" name="Straight Connector 86"/>
+          <p:cNvCxnSpPr/>
+          <p:nvPr/>
+        </p:nvCxnSpPr>
+        <p:spPr>
+          <a:xfrm>
+            <a:off x="5817445" y="1395552"/>
+            <a:ext cx="0" cy="72000"/>
+          </a:xfrm>
+          <a:prstGeom prst="line">
+            <a:avLst/>
+          </a:prstGeom>
+          <a:ln w="38100" cmpd="sng"/>
+        </p:spPr>
+        <p:style>
+          <a:lnRef idx="2">
+            <a:schemeClr val="accent1"/>
+          </a:lnRef>
+          <a:fillRef idx="0">
+            <a:schemeClr val="accent1"/>
+          </a:fillRef>
+          <a:effectRef idx="1">
+            <a:schemeClr val="accent1"/>
+          </a:effectRef>
+          <a:fontRef idx="minor">
+            <a:schemeClr val="tx1"/>
+          </a:fontRef>
+        </p:style>
+      </p:cxnSp>
+      <p:cxnSp>
+        <p:nvCxnSpPr>
+          <p:cNvPr id="88" name="Straight Connector 87"/>
+          <p:cNvCxnSpPr/>
+          <p:nvPr/>
+        </p:nvCxnSpPr>
+        <p:spPr>
+          <a:xfrm>
+            <a:off x="6696953" y="1741344"/>
+            <a:ext cx="0" cy="72000"/>
+          </a:xfrm>
+          <a:prstGeom prst="line">
+            <a:avLst/>
+          </a:prstGeom>
+          <a:ln w="38100" cmpd="sng"/>
+        </p:spPr>
+        <p:style>
+          <a:lnRef idx="2">
+            <a:schemeClr val="accent1"/>
+          </a:lnRef>
+          <a:fillRef idx="0">
+            <a:schemeClr val="accent1"/>
+          </a:fillRef>
+          <a:effectRef idx="1">
+            <a:schemeClr val="accent1"/>
+          </a:effectRef>
+          <a:fontRef idx="minor">
+            <a:schemeClr val="tx1"/>
+          </a:fontRef>
+        </p:style>
+      </p:cxnSp>
+      <p:cxnSp>
+        <p:nvCxnSpPr>
+          <p:cNvPr id="89" name="Straight Connector 88"/>
+          <p:cNvCxnSpPr/>
+          <p:nvPr/>
+        </p:nvCxnSpPr>
+        <p:spPr>
+          <a:xfrm>
+            <a:off x="6696953" y="1638080"/>
+            <a:ext cx="0" cy="72000"/>
+          </a:xfrm>
+          <a:prstGeom prst="line">
+            <a:avLst/>
+          </a:prstGeom>
+          <a:ln w="38100" cmpd="sng"/>
+        </p:spPr>
+        <p:style>
+          <a:lnRef idx="2">
+            <a:schemeClr val="accent1"/>
+          </a:lnRef>
+          <a:fillRef idx="0">
+            <a:schemeClr val="accent1"/>
+          </a:fillRef>
+          <a:effectRef idx="1">
+            <a:schemeClr val="accent1"/>
+          </a:effectRef>
+          <a:fontRef idx="minor">
+            <a:schemeClr val="tx1"/>
+          </a:fontRef>
+        </p:style>
+      </p:cxnSp>
+      <p:cxnSp>
+        <p:nvCxnSpPr>
+          <p:cNvPr id="90" name="Straight Connector 89"/>
+          <p:cNvCxnSpPr/>
+          <p:nvPr/>
+        </p:nvCxnSpPr>
+        <p:spPr>
+          <a:xfrm>
+            <a:off x="6696953" y="1431552"/>
+            <a:ext cx="0" cy="72000"/>
+          </a:xfrm>
+          <a:prstGeom prst="line">
+            <a:avLst/>
+          </a:prstGeom>
+          <a:ln w="38100" cmpd="sng"/>
+        </p:spPr>
+        <p:style>
+          <a:lnRef idx="2">
+            <a:schemeClr val="accent1"/>
+          </a:lnRef>
+          <a:fillRef idx="0">
+            <a:schemeClr val="accent1"/>
+          </a:fillRef>
+          <a:effectRef idx="1">
+            <a:schemeClr val="accent1"/>
+          </a:effectRef>
+          <a:fontRef idx="minor">
+            <a:schemeClr val="tx1"/>
+          </a:fontRef>
+        </p:style>
+      </p:cxnSp>
+      <p:cxnSp>
+        <p:nvCxnSpPr>
+          <p:cNvPr id="91" name="Straight Connector 90"/>
+          <p:cNvCxnSpPr/>
+          <p:nvPr/>
+        </p:nvCxnSpPr>
+        <p:spPr>
+          <a:xfrm>
+            <a:off x="6696953" y="1328288"/>
+            <a:ext cx="0" cy="72000"/>
+          </a:xfrm>
+          <a:prstGeom prst="line">
+            <a:avLst/>
+          </a:prstGeom>
+          <a:ln w="38100" cmpd="sng"/>
+        </p:spPr>
+        <p:style>
+          <a:lnRef idx="2">
+            <a:schemeClr val="accent1"/>
+          </a:lnRef>
+          <a:fillRef idx="0">
+            <a:schemeClr val="accent1"/>
+          </a:fillRef>
+          <a:effectRef idx="1">
+            <a:schemeClr val="accent1"/>
+          </a:effectRef>
+          <a:fontRef idx="minor">
+            <a:schemeClr val="tx1"/>
+          </a:fontRef>
+        </p:style>
+      </p:cxnSp>
+      <p:cxnSp>
+        <p:nvCxnSpPr>
+          <p:cNvPr id="92" name="Straight Connector 91"/>
+          <p:cNvCxnSpPr/>
+          <p:nvPr/>
+        </p:nvCxnSpPr>
+        <p:spPr>
+          <a:xfrm>
+            <a:off x="6696953" y="2051137"/>
+            <a:ext cx="0" cy="72000"/>
+          </a:xfrm>
+          <a:prstGeom prst="line">
+            <a:avLst/>
+          </a:prstGeom>
+          <a:ln w="38100" cmpd="sng"/>
+        </p:spPr>
+        <p:style>
+          <a:lnRef idx="2">
+            <a:schemeClr val="accent1"/>
+          </a:lnRef>
+          <a:fillRef idx="0">
+            <a:schemeClr val="accent1"/>
+          </a:fillRef>
+          <a:effectRef idx="1">
+            <a:schemeClr val="accent1"/>
+          </a:effectRef>
+          <a:fontRef idx="minor">
+            <a:schemeClr val="tx1"/>
+          </a:fontRef>
+        </p:style>
+      </p:cxnSp>
+      <p:cxnSp>
+        <p:nvCxnSpPr>
+          <p:cNvPr id="93" name="Straight Connector 92"/>
+          <p:cNvCxnSpPr/>
+          <p:nvPr/>
+        </p:nvCxnSpPr>
+        <p:spPr>
+          <a:xfrm>
+            <a:off x="6696953" y="1947872"/>
+            <a:ext cx="0" cy="72000"/>
+          </a:xfrm>
+          <a:prstGeom prst="line">
+            <a:avLst/>
+          </a:prstGeom>
+          <a:ln w="38100" cmpd="sng"/>
+        </p:spPr>
+        <p:style>
+          <a:lnRef idx="2">
+            <a:schemeClr val="accent1"/>
+          </a:lnRef>
+          <a:fillRef idx="0">
+            <a:schemeClr val="accent1"/>
+          </a:fillRef>
+          <a:effectRef idx="1">
+            <a:schemeClr val="accent1"/>
+          </a:effectRef>
+          <a:fontRef idx="minor">
+            <a:schemeClr val="tx1"/>
+          </a:fontRef>
+        </p:style>
+      </p:cxnSp>
+      <p:cxnSp>
+        <p:nvCxnSpPr>
+          <p:cNvPr id="94" name="Straight Connector 93"/>
+          <p:cNvCxnSpPr/>
+          <p:nvPr/>
+        </p:nvCxnSpPr>
+        <p:spPr>
+          <a:xfrm>
+            <a:off x="6696953" y="1844608"/>
+            <a:ext cx="0" cy="72000"/>
+          </a:xfrm>
+          <a:prstGeom prst="line">
+            <a:avLst/>
+          </a:prstGeom>
+          <a:ln w="38100" cmpd="sng"/>
+        </p:spPr>
+        <p:style>
+          <a:lnRef idx="2">
+            <a:schemeClr val="accent1"/>
+          </a:lnRef>
+          <a:fillRef idx="0">
+            <a:schemeClr val="accent1"/>
+          </a:fillRef>
+          <a:effectRef idx="1">
+            <a:schemeClr val="accent1"/>
+          </a:effectRef>
+          <a:fontRef idx="minor">
+            <a:schemeClr val="tx1"/>
+          </a:fontRef>
+        </p:style>
+      </p:cxnSp>
+      <p:cxnSp>
+        <p:nvCxnSpPr>
+          <p:cNvPr id="96" name="Straight Connector 95"/>
+          <p:cNvCxnSpPr/>
+          <p:nvPr/>
+        </p:nvCxnSpPr>
+        <p:spPr>
+          <a:xfrm>
+            <a:off x="6696953" y="1534816"/>
+            <a:ext cx="0" cy="72000"/>
+          </a:xfrm>
+          <a:prstGeom prst="line">
+            <a:avLst/>
+          </a:prstGeom>
+          <a:ln w="38100" cmpd="sng"/>
+        </p:spPr>
+        <p:style>
+          <a:lnRef idx="2">
+            <a:schemeClr val="accent1"/>
+          </a:lnRef>
+          <a:fillRef idx="0">
+            <a:schemeClr val="accent1"/>
+          </a:fillRef>
+          <a:effectRef idx="1">
+            <a:schemeClr val="accent1"/>
+          </a:effectRef>
+          <a:fontRef idx="minor">
+            <a:schemeClr val="tx1"/>
+          </a:fontRef>
+        </p:style>
+      </p:cxnSp>
+      <p:cxnSp>
+        <p:nvCxnSpPr>
+          <p:cNvPr id="97" name="Straight Connector 96"/>
+          <p:cNvCxnSpPr/>
+          <p:nvPr/>
+        </p:nvCxnSpPr>
+        <p:spPr>
+          <a:xfrm>
+            <a:off x="5817445" y="3789032"/>
+            <a:ext cx="0" cy="72000"/>
+          </a:xfrm>
+          <a:prstGeom prst="line">
+            <a:avLst/>
+          </a:prstGeom>
+          <a:ln w="38100" cmpd="sng"/>
+        </p:spPr>
+        <p:style>
+          <a:lnRef idx="2">
+            <a:schemeClr val="accent1"/>
+          </a:lnRef>
+          <a:fillRef idx="0">
+            <a:schemeClr val="accent1"/>
+          </a:fillRef>
+          <a:effectRef idx="1">
+            <a:schemeClr val="accent1"/>
+          </a:effectRef>
+          <a:fontRef idx="minor">
+            <a:schemeClr val="tx1"/>
+          </a:fontRef>
+        </p:style>
+      </p:cxnSp>
+      <p:cxnSp>
+        <p:nvCxnSpPr>
+          <p:cNvPr id="98" name="Straight Connector 97"/>
+          <p:cNvCxnSpPr/>
+          <p:nvPr/>
+        </p:nvCxnSpPr>
+        <p:spPr>
+          <a:xfrm>
+            <a:off x="5817445" y="3685768"/>
+            <a:ext cx="0" cy="72000"/>
+          </a:xfrm>
+          <a:prstGeom prst="line">
+            <a:avLst/>
+          </a:prstGeom>
+          <a:ln w="38100" cmpd="sng"/>
+        </p:spPr>
+        <p:style>
+          <a:lnRef idx="2">
+            <a:schemeClr val="accent1"/>
+          </a:lnRef>
+          <a:fillRef idx="0">
+            <a:schemeClr val="accent1"/>
+          </a:fillRef>
+          <a:effectRef idx="1">
+            <a:schemeClr val="accent1"/>
+          </a:effectRef>
+          <a:fontRef idx="minor">
+            <a:schemeClr val="tx1"/>
+          </a:fontRef>
+        </p:style>
+      </p:cxnSp>
+      <p:cxnSp>
+        <p:nvCxnSpPr>
+          <p:cNvPr id="100" name="Straight Connector 99"/>
+          <p:cNvCxnSpPr/>
+          <p:nvPr/>
+        </p:nvCxnSpPr>
+        <p:spPr>
+          <a:xfrm>
+            <a:off x="5817445" y="3479240"/>
+            <a:ext cx="0" cy="72000"/>
+          </a:xfrm>
+          <a:prstGeom prst="line">
+            <a:avLst/>
+          </a:prstGeom>
+          <a:ln w="38100" cmpd="sng"/>
+        </p:spPr>
+        <p:style>
+          <a:lnRef idx="2">
+            <a:schemeClr val="accent1"/>
+          </a:lnRef>
+          <a:fillRef idx="0">
+            <a:schemeClr val="accent1"/>
+          </a:fillRef>
+          <a:effectRef idx="1">
+            <a:schemeClr val="accent1"/>
+          </a:effectRef>
+          <a:fontRef idx="minor">
+            <a:schemeClr val="tx1"/>
+          </a:fontRef>
+        </p:style>
+      </p:cxnSp>
+      <p:cxnSp>
+        <p:nvCxnSpPr>
+          <p:cNvPr id="101" name="Straight Connector 100"/>
+          <p:cNvCxnSpPr/>
+          <p:nvPr/>
+        </p:nvCxnSpPr>
+        <p:spPr>
+          <a:xfrm>
+            <a:off x="5817445" y="3375976"/>
+            <a:ext cx="0" cy="72000"/>
+          </a:xfrm>
+          <a:prstGeom prst="line">
+            <a:avLst/>
+          </a:prstGeom>
+          <a:ln w="38100" cmpd="sng"/>
+        </p:spPr>
+        <p:style>
+          <a:lnRef idx="2">
+            <a:schemeClr val="accent1"/>
+          </a:lnRef>
+          <a:fillRef idx="0">
+            <a:schemeClr val="accent1"/>
+          </a:fillRef>
+          <a:effectRef idx="1">
+            <a:schemeClr val="accent1"/>
+          </a:effectRef>
+          <a:fontRef idx="minor">
+            <a:schemeClr val="tx1"/>
+          </a:fontRef>
+        </p:style>
+      </p:cxnSp>
+      <p:cxnSp>
+        <p:nvCxnSpPr>
+          <p:cNvPr id="105" name="Straight Connector 104"/>
+          <p:cNvCxnSpPr/>
+          <p:nvPr/>
+        </p:nvCxnSpPr>
+        <p:spPr>
+          <a:xfrm>
+            <a:off x="5817445" y="3995560"/>
+            <a:ext cx="0" cy="72000"/>
+          </a:xfrm>
+          <a:prstGeom prst="line">
+            <a:avLst/>
+          </a:prstGeom>
+          <a:ln w="38100" cmpd="sng"/>
+        </p:spPr>
+        <p:style>
+          <a:lnRef idx="2">
+            <a:schemeClr val="accent1"/>
+          </a:lnRef>
+          <a:fillRef idx="0">
+            <a:schemeClr val="accent1"/>
+          </a:fillRef>
+          <a:effectRef idx="1">
+            <a:schemeClr val="accent1"/>
+          </a:effectRef>
+          <a:fontRef idx="minor">
+            <a:schemeClr val="tx1"/>
+          </a:fontRef>
+        </p:style>
+      </p:cxnSp>
+      <p:cxnSp>
+        <p:nvCxnSpPr>
+          <p:cNvPr id="108" name="Straight Connector 107"/>
+          <p:cNvCxnSpPr/>
+          <p:nvPr/>
+        </p:nvCxnSpPr>
+        <p:spPr>
+          <a:xfrm>
+            <a:off x="5817445" y="3892296"/>
+            <a:ext cx="0" cy="72000"/>
+          </a:xfrm>
+          <a:prstGeom prst="line">
+            <a:avLst/>
+          </a:prstGeom>
+          <a:ln w="38100" cmpd="sng"/>
+        </p:spPr>
+        <p:style>
+          <a:lnRef idx="2">
+            <a:schemeClr val="accent1"/>
+          </a:lnRef>
+          <a:fillRef idx="0">
+            <a:schemeClr val="accent1"/>
+          </a:fillRef>
+          <a:effectRef idx="1">
+            <a:schemeClr val="accent1"/>
+          </a:effectRef>
+          <a:fontRef idx="minor">
+            <a:schemeClr val="tx1"/>
+          </a:fontRef>
+        </p:style>
+      </p:cxnSp>
+      <p:cxnSp>
+        <p:nvCxnSpPr>
+          <p:cNvPr id="111" name="Straight Connector 110"/>
+          <p:cNvCxnSpPr/>
+          <p:nvPr/>
+        </p:nvCxnSpPr>
+        <p:spPr>
+          <a:xfrm>
+            <a:off x="5817445" y="3582504"/>
+            <a:ext cx="0" cy="72000"/>
+          </a:xfrm>
+          <a:prstGeom prst="line">
+            <a:avLst/>
+          </a:prstGeom>
+          <a:ln w="38100" cmpd="sng"/>
+        </p:spPr>
+        <p:style>
+          <a:lnRef idx="2">
+            <a:schemeClr val="accent1"/>
+          </a:lnRef>
+          <a:fillRef idx="0">
+            <a:schemeClr val="accent1"/>
+          </a:fillRef>
+          <a:effectRef idx="1">
+            <a:schemeClr val="accent1"/>
+          </a:effectRef>
+          <a:fontRef idx="minor">
+            <a:schemeClr val="tx1"/>
+          </a:fontRef>
+        </p:style>
+      </p:cxnSp>
+      <p:cxnSp>
+        <p:nvCxnSpPr>
+          <p:cNvPr id="117" name="Straight Connector 116"/>
+          <p:cNvCxnSpPr/>
+          <p:nvPr/>
+        </p:nvCxnSpPr>
+        <p:spPr>
+          <a:xfrm>
+            <a:off x="5817445" y="1844608"/>
+            <a:ext cx="0" cy="72000"/>
+          </a:xfrm>
+          <a:prstGeom prst="line">
+            <a:avLst/>
+          </a:prstGeom>
+          <a:ln w="38100" cmpd="sng"/>
+        </p:spPr>
+        <p:style>
+          <a:lnRef idx="2">
+            <a:schemeClr val="accent1"/>
+          </a:lnRef>
+          <a:fillRef idx="0">
+            <a:schemeClr val="accent1"/>
+          </a:fillRef>
+          <a:effectRef idx="1">
+            <a:schemeClr val="accent1"/>
+          </a:effectRef>
+          <a:fontRef idx="minor">
+            <a:schemeClr val="tx1"/>
+          </a:fontRef>
+        </p:style>
+      </p:cxnSp>
     </p:spTree>
     <p:extLst>
       <p:ext uri="{BB962C8B-B14F-4D97-AF65-F5344CB8AC3E}">
@@ -5986,16 +5739,11 @@
               <a:rPr lang="en-US" sz="1200" b="1" dirty="0" smtClean="0"/>
               <a:t>Level 1 </a:t>
             </a:r>
-            <a:endParaRPr lang="en-US" sz="1200" b="1" dirty="0" smtClean="0"/>
           </a:p>
           <a:p>
             <a:r>
               <a:rPr lang="en-US" sz="1200" dirty="0" smtClean="0"/>
-              <a:t>1</a:t>
-            </a:r>
-            <a:r>
-              <a:rPr lang="en-US" sz="1200" dirty="0" smtClean="0"/>
-              <a:t>. Higher </a:t>
+              <a:t>1. Higher </a:t>
             </a:r>
             <a:r>
               <a:rPr lang="en-US" sz="1200" dirty="0"/>
@@ -6417,16 +6165,25 @@
               <a:t>A: </a:t>
             </a:r>
             <a:r>
+              <a:rPr lang="en-US" sz="1600" dirty="0" smtClean="0"/>
+              <a:t>Bloomberg</a:t>
+            </a:r>
+            <a:endParaRPr lang="en-US" sz="1600" dirty="0"/>
+          </a:p>
+          <a:p>
+            <a:r>
+              <a:rPr lang="en-US" sz="1600" dirty="0" smtClean="0"/>
+              <a:t>B</a:t>
+            </a:r>
+            <a:r>
+              <a:rPr lang="en-US" sz="1600" dirty="0"/>
+              <a:t>: </a:t>
+            </a:r>
+            <a:r>
               <a:rPr lang="en-US" sz="1600" dirty="0" err="1"/>
               <a:t>Baidu</a:t>
             </a:r>
-            <a:endParaRPr lang="en-US" sz="1600" dirty="0"/>
-          </a:p>
-          <a:p>
-            <a:r>
-              <a:rPr lang="en-US" sz="1600" dirty="0" smtClean="0"/>
-              <a:t>B: Bloomberg</a:t>
-            </a:r>
+            <a:endParaRPr lang="en-US" sz="1600" dirty="0" smtClean="0"/>
           </a:p>
           <a:p>
             <a:r>
@@ -6465,20 +6222,20 @@
       </p:sp>
       <p:sp>
         <p:nvSpPr>
-          <p:cNvPr id="32" name="Rectangle 31"/>
+          <p:cNvPr id="34" name="Rectangle 33"/>
           <p:cNvSpPr/>
           <p:nvPr/>
         </p:nvSpPr>
         <p:spPr>
-          <a:xfrm rot="5400000">
-            <a:off x="6419272" y="1476485"/>
-            <a:ext cx="144000" cy="208800"/>
+          <a:xfrm>
+            <a:off x="6562074" y="2883702"/>
+            <a:ext cx="144000" cy="432000"/>
           </a:xfrm>
           <a:prstGeom prst="rect">
             <a:avLst/>
           </a:prstGeom>
           <a:solidFill>
-            <a:srgbClr val="FDEADA"/>
+            <a:schemeClr val="accent6"/>
           </a:solidFill>
           <a:ln w="12700" cmpd="sng">
             <a:solidFill>
@@ -6503,12 +6260,12 @@
           </a:fontRef>
         </p:style>
         <p:txBody>
-          <a:bodyPr vert="vert270" lIns="0" rIns="0" rtlCol="0" anchor="ctr"/>
+          <a:bodyPr wrap="none" lIns="0" rIns="0" rtlCol="0" anchor="ctr"/>
           <a:lstStyle/>
           <a:p>
             <a:pPr algn="ctr"/>
             <a:r>
-              <a:rPr lang="en-US" sz="1100" dirty="0" smtClean="0">
+              <a:rPr lang="en-US" sz="1000" dirty="0" smtClean="0">
                 <a:ln w="3175" cmpd="sng">
                   <a:solidFill>
                     <a:srgbClr val="000000"/>
@@ -6517,9 +6274,9 @@
                 <a:latin typeface="Arial"/>
                 <a:cs typeface="Arial"/>
               </a:rPr>
-              <a:t>F</a:t>
-            </a:r>
-            <a:endParaRPr lang="en-US" sz="1100" dirty="0">
+              <a:t>B</a:t>
+            </a:r>
+            <a:endParaRPr lang="en-US" sz="1000" dirty="0">
               <a:ln w="3175" cmpd="sng">
                 <a:solidFill>
                   <a:srgbClr val="000000"/>
@@ -6533,23 +6290,20 @@
       </p:sp>
       <p:sp>
         <p:nvSpPr>
-          <p:cNvPr id="33" name="Rectangle 32"/>
+          <p:cNvPr id="36" name="Rectangle 35"/>
           <p:cNvSpPr/>
           <p:nvPr/>
         </p:nvSpPr>
         <p:spPr>
-          <a:xfrm rot="5400000">
-            <a:off x="6124754" y="1480274"/>
+          <a:xfrm>
+            <a:off x="6564949" y="3754199"/>
             <a:ext cx="144000" cy="208800"/>
           </a:xfrm>
           <a:prstGeom prst="rect">
             <a:avLst/>
           </a:prstGeom>
           <a:solidFill>
-            <a:schemeClr val="accent6">
-              <a:lumMod val="20000"/>
-              <a:lumOff val="80000"/>
-            </a:schemeClr>
+            <a:srgbClr val="FDEADA"/>
           </a:solidFill>
           <a:ln w="12700" cmpd="sng">
             <a:solidFill>
@@ -6574,7 +6328,7 @@
           </a:fontRef>
         </p:style>
         <p:txBody>
-          <a:bodyPr vert="vert270" lIns="0" rIns="0" rtlCol="0" anchor="ctr"/>
+          <a:bodyPr lIns="0" rIns="0" rtlCol="0" anchor="ctr"/>
           <a:lstStyle/>
           <a:p>
             <a:pPr algn="ctr"/>
@@ -6588,7 +6342,7 @@
                 <a:latin typeface="Arial"/>
                 <a:cs typeface="Arial"/>
               </a:rPr>
-              <a:t>E</a:t>
+              <a:t>D</a:t>
             </a:r>
             <a:endParaRPr lang="en-US" sz="1100" dirty="0">
               <a:ln w="3175" cmpd="sng">
@@ -6604,20 +6358,23 @@
       </p:sp>
       <p:sp>
         <p:nvSpPr>
-          <p:cNvPr id="34" name="Rectangle 33"/>
+          <p:cNvPr id="37" name="Rectangle 36"/>
           <p:cNvSpPr/>
           <p:nvPr/>
         </p:nvSpPr>
         <p:spPr>
           <a:xfrm>
-            <a:off x="6562074" y="2928006"/>
-            <a:ext cx="144000" cy="432000"/>
+            <a:off x="6564949" y="3501058"/>
+            <a:ext cx="144000" cy="208800"/>
           </a:xfrm>
           <a:prstGeom prst="rect">
             <a:avLst/>
           </a:prstGeom>
           <a:solidFill>
-            <a:schemeClr val="accent6"/>
+            <a:schemeClr val="accent6">
+              <a:lumMod val="20000"/>
+              <a:lumOff val="80000"/>
+            </a:schemeClr>
           </a:solidFill>
           <a:ln w="12700" cmpd="sng">
             <a:solidFill>
@@ -6642,12 +6399,12 @@
           </a:fontRef>
         </p:style>
         <p:txBody>
-          <a:bodyPr wrap="none" lIns="0" rIns="0" rtlCol="0" anchor="ctr"/>
+          <a:bodyPr lIns="0" rIns="0" rtlCol="0" anchor="ctr"/>
           <a:lstStyle/>
           <a:p>
             <a:pPr algn="ctr"/>
             <a:r>
-              <a:rPr lang="en-US" sz="1000" dirty="0" smtClean="0">
+              <a:rPr lang="en-US" sz="1100" dirty="0" smtClean="0">
                 <a:ln w="3175" cmpd="sng">
                   <a:solidFill>
                     <a:srgbClr val="000000"/>
@@ -6656,9 +6413,9 @@
                 <a:latin typeface="Arial"/>
                 <a:cs typeface="Arial"/>
               </a:rPr>
-              <a:t>B</a:t>
-            </a:r>
-            <a:endParaRPr lang="en-US" sz="1000" dirty="0">
+              <a:t>C</a:t>
+            </a:r>
+            <a:endParaRPr lang="en-US" sz="1100" dirty="0">
               <a:ln w="3175" cmpd="sng">
                 <a:solidFill>
                   <a:srgbClr val="000000"/>
@@ -6672,20 +6429,20 @@
       </p:sp>
       <p:sp>
         <p:nvSpPr>
-          <p:cNvPr id="36" name="Rectangle 35"/>
+          <p:cNvPr id="38" name="Rectangle 37"/>
           <p:cNvSpPr/>
           <p:nvPr/>
         </p:nvSpPr>
         <p:spPr>
           <a:xfrm>
-            <a:off x="6564949" y="3754199"/>
-            <a:ext cx="144000" cy="208800"/>
+            <a:off x="6564949" y="2328330"/>
+            <a:ext cx="144000" cy="432000"/>
           </a:xfrm>
           <a:prstGeom prst="rect">
             <a:avLst/>
           </a:prstGeom>
           <a:solidFill>
-            <a:srgbClr val="FDEADA"/>
+            <a:schemeClr val="accent6"/>
           </a:solidFill>
           <a:ln w="12700" cmpd="sng">
             <a:solidFill>
@@ -6724,7 +6481,7 @@
                 <a:latin typeface="Arial"/>
                 <a:cs typeface="Arial"/>
               </a:rPr>
-              <a:t>D</a:t>
+              <a:t>A</a:t>
             </a:r>
             <a:endParaRPr lang="en-US" sz="1100" dirty="0">
               <a:ln w="3175" cmpd="sng">
@@ -6740,23 +6497,20 @@
       </p:sp>
       <p:sp>
         <p:nvSpPr>
-          <p:cNvPr id="37" name="Rectangle 36"/>
+          <p:cNvPr id="15" name="Rectangle 14"/>
           <p:cNvSpPr/>
           <p:nvPr/>
         </p:nvSpPr>
         <p:spPr>
           <a:xfrm>
-            <a:off x="6564949" y="3501058"/>
+            <a:off x="6107149" y="3360006"/>
             <a:ext cx="144000" cy="208800"/>
           </a:xfrm>
           <a:prstGeom prst="rect">
             <a:avLst/>
           </a:prstGeom>
           <a:solidFill>
-            <a:schemeClr val="accent6">
-              <a:lumMod val="20000"/>
-              <a:lumOff val="80000"/>
-            </a:schemeClr>
+            <a:srgbClr val="FDEADA"/>
           </a:solidFill>
           <a:ln w="12700" cmpd="sng">
             <a:solidFill>
@@ -6795,7 +6549,7 @@
                 <a:latin typeface="Arial"/>
                 <a:cs typeface="Arial"/>
               </a:rPr>
-              <a:t>C</a:t>
+              <a:t>E</a:t>
             </a:r>
             <a:endParaRPr lang="en-US" sz="1100" dirty="0">
               <a:ln w="3175" cmpd="sng">
@@ -6811,20 +6565,23 @@
       </p:sp>
       <p:sp>
         <p:nvSpPr>
-          <p:cNvPr id="38" name="Rectangle 37"/>
+          <p:cNvPr id="16" name="Rectangle 15"/>
           <p:cNvSpPr/>
           <p:nvPr/>
         </p:nvSpPr>
         <p:spPr>
           <a:xfrm>
-            <a:off x="6564949" y="2357866"/>
-            <a:ext cx="144000" cy="432000"/>
+            <a:off x="6107149" y="3106865"/>
+            <a:ext cx="144000" cy="208800"/>
           </a:xfrm>
           <a:prstGeom prst="rect">
             <a:avLst/>
           </a:prstGeom>
           <a:solidFill>
-            <a:schemeClr val="accent6"/>
+            <a:schemeClr val="accent6">
+              <a:lumMod val="20000"/>
+              <a:lumOff val="80000"/>
+            </a:schemeClr>
           </a:solidFill>
           <a:ln w="12700" cmpd="sng">
             <a:solidFill>
@@ -6863,7 +6620,7 @@
                 <a:latin typeface="Arial"/>
                 <a:cs typeface="Arial"/>
               </a:rPr>
-              <a:t>A</a:t>
+              <a:t>F</a:t>
             </a:r>
             <a:endParaRPr lang="en-US" sz="1100" dirty="0">
               <a:ln w="3175" cmpd="sng">

</xml_diff>